<commit_message>
working on iccp poster
</commit_message>
<xml_diff>
--- a/cdp/iccpPoster/iccpPoster.pptx
+++ b/cdp/iccpPoster/iccpPoster.pptx
@@ -2,12 +2,15 @@
 <file path=ppt/presentation.xml><?xml version="1.0" encoding="utf-8"?>
 <p:presentation xmlns:a="http://schemas.openxmlformats.org/drawingml/2006/main" xmlns:r="http://schemas.openxmlformats.org/officeDocument/2006/relationships" xmlns:p="http://schemas.openxmlformats.org/presentationml/2006/main" saveSubsetFonts="1" autoCompressPictures="0">
   <p:sldMasterIdLst>
-    <p:sldMasterId id="2147483672" r:id="rId1"/>
+    <p:sldMasterId id="2147483684" r:id="rId1"/>
   </p:sldMasterIdLst>
+  <p:notesMasterIdLst>
+    <p:notesMasterId r:id="rId3"/>
+  </p:notesMasterIdLst>
   <p:sldIdLst>
     <p:sldId id="256" r:id="rId2"/>
   </p:sldIdLst>
-  <p:sldSz cx="42794238" cy="30267275"/>
+  <p:sldSz cx="30267275" cy="42794238"/>
   <p:notesSz cx="6858000" cy="9144000"/>
   <p:defaultTextStyle>
     <a:defPPr>
@@ -104,7 +107,457 @@
       </a:defRPr>
     </a:lvl9pPr>
   </p:defaultTextStyle>
+  <p:extLst>
+    <p:ext uri="{EFAFB233-063F-42B5-8137-9DF3F51BA10A}">
+      <p15:sldGuideLst xmlns:p15="http://schemas.microsoft.com/office/powerpoint/2012/main">
+        <p15:guide id="2" pos="9533" userDrawn="1">
+          <p15:clr>
+            <a:srgbClr val="A4A3A4"/>
+          </p15:clr>
+        </p15:guide>
+      </p15:sldGuideLst>
+    </p:ext>
+  </p:extLst>
 </p:presentation>
+</file>
+
+<file path=ppt/notesMasters/notesMaster1.xml><?xml version="1.0" encoding="utf-8"?>
+<p:notesMaster xmlns:a="http://schemas.openxmlformats.org/drawingml/2006/main" xmlns:r="http://schemas.openxmlformats.org/officeDocument/2006/relationships" xmlns:p="http://schemas.openxmlformats.org/presentationml/2006/main">
+  <p:cSld>
+    <p:bg>
+      <p:bgRef idx="1001">
+        <a:schemeClr val="bg1"/>
+      </p:bgRef>
+    </p:bg>
+    <p:spTree>
+      <p:nvGrpSpPr>
+        <p:cNvPr id="1" name=""/>
+        <p:cNvGrpSpPr/>
+        <p:nvPr/>
+      </p:nvGrpSpPr>
+      <p:grpSpPr>
+        <a:xfrm>
+          <a:off x="0" y="0"/>
+          <a:ext cx="0" cy="0"/>
+          <a:chOff x="0" y="0"/>
+          <a:chExt cx="0" cy="0"/>
+        </a:xfrm>
+      </p:grpSpPr>
+      <p:sp>
+        <p:nvSpPr>
+          <p:cNvPr id="2" name="Header Placeholder 1"/>
+          <p:cNvSpPr>
+            <a:spLocks noGrp="1"/>
+          </p:cNvSpPr>
+          <p:nvPr>
+            <p:ph type="hdr" sz="quarter"/>
+          </p:nvPr>
+        </p:nvSpPr>
+        <p:spPr>
+          <a:xfrm>
+            <a:off x="0" y="0"/>
+            <a:ext cx="2971800" cy="458788"/>
+          </a:xfrm>
+          <a:prstGeom prst="rect">
+            <a:avLst/>
+          </a:prstGeom>
+        </p:spPr>
+        <p:txBody>
+          <a:bodyPr vert="horz" lIns="91440" tIns="45720" rIns="91440" bIns="45720" rtlCol="0"/>
+          <a:lstStyle>
+            <a:lvl1pPr algn="l">
+              <a:defRPr sz="1200"/>
+            </a:lvl1pPr>
+          </a:lstStyle>
+          <a:p>
+            <a:endParaRPr lang="en-US"/>
+          </a:p>
+        </p:txBody>
+      </p:sp>
+      <p:sp>
+        <p:nvSpPr>
+          <p:cNvPr id="3" name="Date Placeholder 2"/>
+          <p:cNvSpPr>
+            <a:spLocks noGrp="1"/>
+          </p:cNvSpPr>
+          <p:nvPr>
+            <p:ph type="dt" idx="1"/>
+          </p:nvPr>
+        </p:nvSpPr>
+        <p:spPr>
+          <a:xfrm>
+            <a:off x="3884613" y="0"/>
+            <a:ext cx="2971800" cy="458788"/>
+          </a:xfrm>
+          <a:prstGeom prst="rect">
+            <a:avLst/>
+          </a:prstGeom>
+        </p:spPr>
+        <p:txBody>
+          <a:bodyPr vert="horz" lIns="91440" tIns="45720" rIns="91440" bIns="45720" rtlCol="0"/>
+          <a:lstStyle>
+            <a:lvl1pPr algn="r">
+              <a:defRPr sz="1200"/>
+            </a:lvl1pPr>
+          </a:lstStyle>
+          <a:p>
+            <a:fld id="{473B2F62-7B0C-0D4E-89AA-04FB4AE1B4E3}" type="datetimeFigureOut">
+              <a:rPr lang="en-US" smtClean="0"/>
+              <a:t>6/27/16</a:t>
+            </a:fld>
+            <a:endParaRPr lang="en-US"/>
+          </a:p>
+        </p:txBody>
+      </p:sp>
+      <p:sp>
+        <p:nvSpPr>
+          <p:cNvPr id="4" name="Slide Image Placeholder 3"/>
+          <p:cNvSpPr>
+            <a:spLocks noGrp="1" noRot="1" noChangeAspect="1"/>
+          </p:cNvSpPr>
+          <p:nvPr>
+            <p:ph type="sldImg" idx="2"/>
+          </p:nvPr>
+        </p:nvSpPr>
+        <p:spPr>
+          <a:xfrm>
+            <a:off x="2338388" y="1143000"/>
+            <a:ext cx="2181225" cy="3086100"/>
+          </a:xfrm>
+          <a:prstGeom prst="rect">
+            <a:avLst/>
+          </a:prstGeom>
+          <a:noFill/>
+          <a:ln w="12700">
+            <a:solidFill>
+              <a:prstClr val="black"/>
+            </a:solidFill>
+          </a:ln>
+        </p:spPr>
+        <p:txBody>
+          <a:bodyPr vert="horz" lIns="91440" tIns="45720" rIns="91440" bIns="45720" rtlCol="0" anchor="ctr"/>
+          <a:lstStyle/>
+          <a:p>
+            <a:endParaRPr lang="en-US"/>
+          </a:p>
+        </p:txBody>
+      </p:sp>
+      <p:sp>
+        <p:nvSpPr>
+          <p:cNvPr id="5" name="Notes Placeholder 4"/>
+          <p:cNvSpPr>
+            <a:spLocks noGrp="1"/>
+          </p:cNvSpPr>
+          <p:nvPr>
+            <p:ph type="body" sz="quarter" idx="3"/>
+          </p:nvPr>
+        </p:nvSpPr>
+        <p:spPr>
+          <a:xfrm>
+            <a:off x="685800" y="4400550"/>
+            <a:ext cx="5486400" cy="3600450"/>
+          </a:xfrm>
+          <a:prstGeom prst="rect">
+            <a:avLst/>
+          </a:prstGeom>
+        </p:spPr>
+        <p:txBody>
+          <a:bodyPr vert="horz" lIns="91440" tIns="45720" rIns="91440" bIns="45720" rtlCol="0"/>
+          <a:lstStyle/>
+          <a:p>
+            <a:pPr lvl="0"/>
+            <a:r>
+              <a:rPr lang="en-US" smtClean="0"/>
+              <a:t>Click to edit Master text styles</a:t>
+            </a:r>
+          </a:p>
+          <a:p>
+            <a:pPr lvl="1"/>
+            <a:r>
+              <a:rPr lang="en-US" smtClean="0"/>
+              <a:t>Second level</a:t>
+            </a:r>
+          </a:p>
+          <a:p>
+            <a:pPr lvl="2"/>
+            <a:r>
+              <a:rPr lang="en-US" smtClean="0"/>
+              <a:t>Third level</a:t>
+            </a:r>
+          </a:p>
+          <a:p>
+            <a:pPr lvl="3"/>
+            <a:r>
+              <a:rPr lang="en-US" smtClean="0"/>
+              <a:t>Fourth level</a:t>
+            </a:r>
+          </a:p>
+          <a:p>
+            <a:pPr lvl="4"/>
+            <a:r>
+              <a:rPr lang="en-US" smtClean="0"/>
+              <a:t>Fifth level</a:t>
+            </a:r>
+            <a:endParaRPr lang="en-US"/>
+          </a:p>
+        </p:txBody>
+      </p:sp>
+      <p:sp>
+        <p:nvSpPr>
+          <p:cNvPr id="6" name="Footer Placeholder 5"/>
+          <p:cNvSpPr>
+            <a:spLocks noGrp="1"/>
+          </p:cNvSpPr>
+          <p:nvPr>
+            <p:ph type="ftr" sz="quarter" idx="4"/>
+          </p:nvPr>
+        </p:nvSpPr>
+        <p:spPr>
+          <a:xfrm>
+            <a:off x="0" y="8685213"/>
+            <a:ext cx="2971800" cy="458787"/>
+          </a:xfrm>
+          <a:prstGeom prst="rect">
+            <a:avLst/>
+          </a:prstGeom>
+        </p:spPr>
+        <p:txBody>
+          <a:bodyPr vert="horz" lIns="91440" tIns="45720" rIns="91440" bIns="45720" rtlCol="0" anchor="b"/>
+          <a:lstStyle>
+            <a:lvl1pPr algn="l">
+              <a:defRPr sz="1200"/>
+            </a:lvl1pPr>
+          </a:lstStyle>
+          <a:p>
+            <a:endParaRPr lang="en-US"/>
+          </a:p>
+        </p:txBody>
+      </p:sp>
+      <p:sp>
+        <p:nvSpPr>
+          <p:cNvPr id="7" name="Slide Number Placeholder 6"/>
+          <p:cNvSpPr>
+            <a:spLocks noGrp="1"/>
+          </p:cNvSpPr>
+          <p:nvPr>
+            <p:ph type="sldNum" sz="quarter" idx="5"/>
+          </p:nvPr>
+        </p:nvSpPr>
+        <p:spPr>
+          <a:xfrm>
+            <a:off x="3884613" y="8685213"/>
+            <a:ext cx="2971800" cy="458787"/>
+          </a:xfrm>
+          <a:prstGeom prst="rect">
+            <a:avLst/>
+          </a:prstGeom>
+        </p:spPr>
+        <p:txBody>
+          <a:bodyPr vert="horz" lIns="91440" tIns="45720" rIns="91440" bIns="45720" rtlCol="0" anchor="b"/>
+          <a:lstStyle>
+            <a:lvl1pPr algn="r">
+              <a:defRPr sz="1200"/>
+            </a:lvl1pPr>
+          </a:lstStyle>
+          <a:p>
+            <a:fld id="{2513D937-E522-9A40-BE14-FEF7C011CA7A}" type="slidenum">
+              <a:rPr lang="en-US" smtClean="0"/>
+              <a:t>‹#›</a:t>
+            </a:fld>
+            <a:endParaRPr lang="en-US"/>
+          </a:p>
+        </p:txBody>
+      </p:sp>
+    </p:spTree>
+    <p:extLst>
+      <p:ext uri="{BB962C8B-B14F-4D97-AF65-F5344CB8AC3E}">
+        <p14:creationId xmlns:p14="http://schemas.microsoft.com/office/powerpoint/2010/main" val="750338134"/>
+      </p:ext>
+    </p:extLst>
+  </p:cSld>
+  <p:clrMap bg1="lt1" tx1="dk1" bg2="lt2" tx2="dk2" accent1="accent1" accent2="accent2" accent3="accent3" accent4="accent4" accent5="accent5" accent6="accent6" hlink="hlink" folHlink="folHlink"/>
+  <p:notesStyle>
+    <a:lvl1pPr marL="0" algn="l" defTabSz="914400" rtl="0" eaLnBrk="1" latinLnBrk="0" hangingPunct="1">
+      <a:defRPr sz="1200" kern="1200">
+        <a:solidFill>
+          <a:schemeClr val="tx1"/>
+        </a:solidFill>
+        <a:latin typeface="+mn-lt"/>
+        <a:ea typeface="+mn-ea"/>
+        <a:cs typeface="+mn-cs"/>
+      </a:defRPr>
+    </a:lvl1pPr>
+    <a:lvl2pPr marL="457200" algn="l" defTabSz="914400" rtl="0" eaLnBrk="1" latinLnBrk="0" hangingPunct="1">
+      <a:defRPr sz="1200" kern="1200">
+        <a:solidFill>
+          <a:schemeClr val="tx1"/>
+        </a:solidFill>
+        <a:latin typeface="+mn-lt"/>
+        <a:ea typeface="+mn-ea"/>
+        <a:cs typeface="+mn-cs"/>
+      </a:defRPr>
+    </a:lvl2pPr>
+    <a:lvl3pPr marL="914400" algn="l" defTabSz="914400" rtl="0" eaLnBrk="1" latinLnBrk="0" hangingPunct="1">
+      <a:defRPr sz="1200" kern="1200">
+        <a:solidFill>
+          <a:schemeClr val="tx1"/>
+        </a:solidFill>
+        <a:latin typeface="+mn-lt"/>
+        <a:ea typeface="+mn-ea"/>
+        <a:cs typeface="+mn-cs"/>
+      </a:defRPr>
+    </a:lvl3pPr>
+    <a:lvl4pPr marL="1371600" algn="l" defTabSz="914400" rtl="0" eaLnBrk="1" latinLnBrk="0" hangingPunct="1">
+      <a:defRPr sz="1200" kern="1200">
+        <a:solidFill>
+          <a:schemeClr val="tx1"/>
+        </a:solidFill>
+        <a:latin typeface="+mn-lt"/>
+        <a:ea typeface="+mn-ea"/>
+        <a:cs typeface="+mn-cs"/>
+      </a:defRPr>
+    </a:lvl4pPr>
+    <a:lvl5pPr marL="1828800" algn="l" defTabSz="914400" rtl="0" eaLnBrk="1" latinLnBrk="0" hangingPunct="1">
+      <a:defRPr sz="1200" kern="1200">
+        <a:solidFill>
+          <a:schemeClr val="tx1"/>
+        </a:solidFill>
+        <a:latin typeface="+mn-lt"/>
+        <a:ea typeface="+mn-ea"/>
+        <a:cs typeface="+mn-cs"/>
+      </a:defRPr>
+    </a:lvl5pPr>
+    <a:lvl6pPr marL="2286000" algn="l" defTabSz="914400" rtl="0" eaLnBrk="1" latinLnBrk="0" hangingPunct="1">
+      <a:defRPr sz="1200" kern="1200">
+        <a:solidFill>
+          <a:schemeClr val="tx1"/>
+        </a:solidFill>
+        <a:latin typeface="+mn-lt"/>
+        <a:ea typeface="+mn-ea"/>
+        <a:cs typeface="+mn-cs"/>
+      </a:defRPr>
+    </a:lvl6pPr>
+    <a:lvl7pPr marL="2743200" algn="l" defTabSz="914400" rtl="0" eaLnBrk="1" latinLnBrk="0" hangingPunct="1">
+      <a:defRPr sz="1200" kern="1200">
+        <a:solidFill>
+          <a:schemeClr val="tx1"/>
+        </a:solidFill>
+        <a:latin typeface="+mn-lt"/>
+        <a:ea typeface="+mn-ea"/>
+        <a:cs typeface="+mn-cs"/>
+      </a:defRPr>
+    </a:lvl7pPr>
+    <a:lvl8pPr marL="3200400" algn="l" defTabSz="914400" rtl="0" eaLnBrk="1" latinLnBrk="0" hangingPunct="1">
+      <a:defRPr sz="1200" kern="1200">
+        <a:solidFill>
+          <a:schemeClr val="tx1"/>
+        </a:solidFill>
+        <a:latin typeface="+mn-lt"/>
+        <a:ea typeface="+mn-ea"/>
+        <a:cs typeface="+mn-cs"/>
+      </a:defRPr>
+    </a:lvl8pPr>
+    <a:lvl9pPr marL="3657600" algn="l" defTabSz="914400" rtl="0" eaLnBrk="1" latinLnBrk="0" hangingPunct="1">
+      <a:defRPr sz="1200" kern="1200">
+        <a:solidFill>
+          <a:schemeClr val="tx1"/>
+        </a:solidFill>
+        <a:latin typeface="+mn-lt"/>
+        <a:ea typeface="+mn-ea"/>
+        <a:cs typeface="+mn-cs"/>
+      </a:defRPr>
+    </a:lvl9pPr>
+  </p:notesStyle>
+</p:notesMaster>
+</file>
+
+<file path=ppt/notesSlides/notesSlide1.xml><?xml version="1.0" encoding="utf-8"?>
+<p:notes xmlns:a="http://schemas.openxmlformats.org/drawingml/2006/main" xmlns:r="http://schemas.openxmlformats.org/officeDocument/2006/relationships" xmlns:p="http://schemas.openxmlformats.org/presentationml/2006/main">
+  <p:cSld>
+    <p:spTree>
+      <p:nvGrpSpPr>
+        <p:cNvPr id="1" name=""/>
+        <p:cNvGrpSpPr/>
+        <p:nvPr/>
+      </p:nvGrpSpPr>
+      <p:grpSpPr>
+        <a:xfrm>
+          <a:off x="0" y="0"/>
+          <a:ext cx="0" cy="0"/>
+          <a:chOff x="0" y="0"/>
+          <a:chExt cx="0" cy="0"/>
+        </a:xfrm>
+      </p:grpSpPr>
+      <p:sp>
+        <p:nvSpPr>
+          <p:cNvPr id="2" name="Slide Image Placeholder 1"/>
+          <p:cNvSpPr>
+            <a:spLocks noGrp="1" noRot="1" noChangeAspect="1"/>
+          </p:cNvSpPr>
+          <p:nvPr>
+            <p:ph type="sldImg"/>
+          </p:nvPr>
+        </p:nvSpPr>
+        <p:spPr>
+          <a:xfrm>
+            <a:off x="2338388" y="1143000"/>
+            <a:ext cx="2181225" cy="3086100"/>
+          </a:xfrm>
+        </p:spPr>
+      </p:sp>
+      <p:sp>
+        <p:nvSpPr>
+          <p:cNvPr id="3" name="Notes Placeholder 2"/>
+          <p:cNvSpPr>
+            <a:spLocks noGrp="1"/>
+          </p:cNvSpPr>
+          <p:nvPr>
+            <p:ph type="body" idx="1"/>
+          </p:nvPr>
+        </p:nvSpPr>
+        <p:spPr/>
+        <p:txBody>
+          <a:bodyPr/>
+          <a:lstStyle/>
+          <a:p>
+            <a:endParaRPr lang="en-US" dirty="0"/>
+          </a:p>
+        </p:txBody>
+      </p:sp>
+      <p:sp>
+        <p:nvSpPr>
+          <p:cNvPr id="4" name="Slide Number Placeholder 3"/>
+          <p:cNvSpPr>
+            <a:spLocks noGrp="1"/>
+          </p:cNvSpPr>
+          <p:nvPr>
+            <p:ph type="sldNum" sz="quarter" idx="10"/>
+          </p:nvPr>
+        </p:nvSpPr>
+        <p:spPr/>
+        <p:txBody>
+          <a:bodyPr/>
+          <a:lstStyle/>
+          <a:p>
+            <a:fld id="{2513D937-E522-9A40-BE14-FEF7C011CA7A}" type="slidenum">
+              <a:rPr lang="en-US" smtClean="0"/>
+              <a:t>1</a:t>
+            </a:fld>
+            <a:endParaRPr lang="en-US"/>
+          </a:p>
+        </p:txBody>
+      </p:sp>
+    </p:spTree>
+    <p:extLst>
+      <p:ext uri="{BB962C8B-B14F-4D97-AF65-F5344CB8AC3E}">
+        <p14:creationId xmlns:p14="http://schemas.microsoft.com/office/powerpoint/2010/main" val="909042954"/>
+      </p:ext>
+    </p:extLst>
+  </p:cSld>
+  <p:clrMapOvr>
+    <a:masterClrMapping/>
+  </p:clrMapOvr>
+</p:notes>
 </file>
 
 <file path=ppt/slideLayouts/slideLayout1.xml><?xml version="1.0" encoding="utf-8"?>
@@ -136,15 +589,15 @@
         </p:nvSpPr>
         <p:spPr>
           <a:xfrm>
-            <a:off x="3209568" y="4953466"/>
-            <a:ext cx="36375102" cy="10537496"/>
+            <a:off x="2270046" y="7003597"/>
+            <a:ext cx="25727184" cy="14898735"/>
           </a:xfrm>
         </p:spPr>
         <p:txBody>
           <a:bodyPr anchor="b"/>
           <a:lstStyle>
             <a:lvl1pPr algn="ctr">
-              <a:defRPr sz="26480"/>
+              <a:defRPr sz="19861"/>
             </a:lvl1pPr>
           </a:lstStyle>
           <a:p>
@@ -168,8 +621,8 @@
         </p:nvSpPr>
         <p:spPr>
           <a:xfrm>
-            <a:off x="5349280" y="15897328"/>
-            <a:ext cx="32095679" cy="7307583"/>
+            <a:off x="3783410" y="22476884"/>
+            <a:ext cx="22700456" cy="10332032"/>
           </a:xfrm>
         </p:spPr>
         <p:txBody>
@@ -177,39 +630,39 @@
           <a:lstStyle>
             <a:lvl1pPr marL="0" indent="0" algn="ctr">
               <a:buNone/>
-              <a:defRPr sz="10592"/>
+              <a:defRPr sz="7944"/>
             </a:lvl1pPr>
-            <a:lvl2pPr marL="2017806" indent="0" algn="ctr">
-              <a:buNone/>
-              <a:defRPr sz="8827"/>
+            <a:lvl2pPr marL="1513378" indent="0" algn="ctr">
+              <a:buNone/>
+              <a:defRPr sz="6620"/>
             </a:lvl2pPr>
-            <a:lvl3pPr marL="4035613" indent="0" algn="ctr">
-              <a:buNone/>
-              <a:defRPr sz="7944"/>
+            <a:lvl3pPr marL="3026755" indent="0" algn="ctr">
+              <a:buNone/>
+              <a:defRPr sz="5958"/>
             </a:lvl3pPr>
-            <a:lvl4pPr marL="6053419" indent="0" algn="ctr">
-              <a:buNone/>
-              <a:defRPr sz="7061"/>
+            <a:lvl4pPr marL="4540133" indent="0" algn="ctr">
+              <a:buNone/>
+              <a:defRPr sz="5296"/>
             </a:lvl4pPr>
-            <a:lvl5pPr marL="8071226" indent="0" algn="ctr">
-              <a:buNone/>
-              <a:defRPr sz="7061"/>
+            <a:lvl5pPr marL="6053511" indent="0" algn="ctr">
+              <a:buNone/>
+              <a:defRPr sz="5296"/>
             </a:lvl5pPr>
-            <a:lvl6pPr marL="10089032" indent="0" algn="ctr">
-              <a:buNone/>
-              <a:defRPr sz="7061"/>
+            <a:lvl6pPr marL="7566889" indent="0" algn="ctr">
+              <a:buNone/>
+              <a:defRPr sz="5296"/>
             </a:lvl6pPr>
-            <a:lvl7pPr marL="12106839" indent="0" algn="ctr">
-              <a:buNone/>
-              <a:defRPr sz="7061"/>
+            <a:lvl7pPr marL="9080266" indent="0" algn="ctr">
+              <a:buNone/>
+              <a:defRPr sz="5296"/>
             </a:lvl7pPr>
-            <a:lvl8pPr marL="14124645" indent="0" algn="ctr">
-              <a:buNone/>
-              <a:defRPr sz="7061"/>
+            <a:lvl8pPr marL="10593644" indent="0" algn="ctr">
+              <a:buNone/>
+              <a:defRPr sz="5296"/>
             </a:lvl8pPr>
-            <a:lvl9pPr marL="16142452" indent="0" algn="ctr">
-              <a:buNone/>
-              <a:defRPr sz="7061"/>
+            <a:lvl9pPr marL="12107022" indent="0" algn="ctr">
+              <a:buNone/>
+              <a:defRPr sz="5296"/>
             </a:lvl9pPr>
           </a:lstStyle>
           <a:p>
@@ -238,7 +691,7 @@
           <a:p>
             <a:fld id="{00DE53A4-4886-8A4E-B0F6-EC4857490DE3}" type="datetimeFigureOut">
               <a:rPr lang="en-US" smtClean="0"/>
-              <a:t>6/24/16</a:t>
+              <a:t>6/27/16</a:t>
             </a:fld>
             <a:endParaRPr lang="en-US"/>
           </a:p>
@@ -289,7 +742,7 @@
     </p:spTree>
     <p:extLst>
       <p:ext uri="{BB962C8B-B14F-4D97-AF65-F5344CB8AC3E}">
-        <p14:creationId xmlns:p14="http://schemas.microsoft.com/office/powerpoint/2010/main" val="1600204696"/>
+        <p14:creationId xmlns:p14="http://schemas.microsoft.com/office/powerpoint/2010/main" val="547433323"/>
       </p:ext>
     </p:extLst>
   </p:cSld>
@@ -408,7 +861,7 @@
           <a:p>
             <a:fld id="{00DE53A4-4886-8A4E-B0F6-EC4857490DE3}" type="datetimeFigureOut">
               <a:rPr lang="en-US" smtClean="0"/>
-              <a:t>6/24/16</a:t>
+              <a:t>6/27/16</a:t>
             </a:fld>
             <a:endParaRPr lang="en-US"/>
           </a:p>
@@ -459,7 +912,7 @@
     </p:spTree>
     <p:extLst>
       <p:ext uri="{BB962C8B-B14F-4D97-AF65-F5344CB8AC3E}">
-        <p14:creationId xmlns:p14="http://schemas.microsoft.com/office/powerpoint/2010/main" val="1279188602"/>
+        <p14:creationId xmlns:p14="http://schemas.microsoft.com/office/powerpoint/2010/main" val="1608665393"/>
       </p:ext>
     </p:extLst>
   </p:cSld>
@@ -498,8 +951,8 @@
         </p:nvSpPr>
         <p:spPr>
           <a:xfrm>
-            <a:off x="30624629" y="1611452"/>
-            <a:ext cx="9227508" cy="25650117"/>
+            <a:off x="21660020" y="2278397"/>
+            <a:ext cx="6526381" cy="36266139"/>
           </a:xfrm>
         </p:spPr>
         <p:txBody>
@@ -526,8 +979,8 @@
         </p:nvSpPr>
         <p:spPr>
           <a:xfrm>
-            <a:off x="2942106" y="1611452"/>
-            <a:ext cx="27147595" cy="25650117"/>
+            <a:off x="2080877" y="2278397"/>
+            <a:ext cx="19200803" cy="36266139"/>
           </a:xfrm>
         </p:spPr>
         <p:txBody>
@@ -588,7 +1041,7 @@
           <a:p>
             <a:fld id="{00DE53A4-4886-8A4E-B0F6-EC4857490DE3}" type="datetimeFigureOut">
               <a:rPr lang="en-US" smtClean="0"/>
-              <a:t>6/24/16</a:t>
+              <a:t>6/27/16</a:t>
             </a:fld>
             <a:endParaRPr lang="en-US"/>
           </a:p>
@@ -639,7 +1092,7 @@
     </p:spTree>
     <p:extLst>
       <p:ext uri="{BB962C8B-B14F-4D97-AF65-F5344CB8AC3E}">
-        <p14:creationId xmlns:p14="http://schemas.microsoft.com/office/powerpoint/2010/main" val="864043697"/>
+        <p14:creationId xmlns:p14="http://schemas.microsoft.com/office/powerpoint/2010/main" val="20144421"/>
       </p:ext>
     </p:extLst>
   </p:cSld>
@@ -758,7 +1211,7 @@
           <a:p>
             <a:fld id="{00DE53A4-4886-8A4E-B0F6-EC4857490DE3}" type="datetimeFigureOut">
               <a:rPr lang="en-US" smtClean="0"/>
-              <a:t>6/24/16</a:t>
+              <a:t>6/27/16</a:t>
             </a:fld>
             <a:endParaRPr lang="en-US"/>
           </a:p>
@@ -809,7 +1262,7 @@
     </p:spTree>
     <p:extLst>
       <p:ext uri="{BB962C8B-B14F-4D97-AF65-F5344CB8AC3E}">
-        <p14:creationId xmlns:p14="http://schemas.microsoft.com/office/powerpoint/2010/main" val="1702614291"/>
+        <p14:creationId xmlns:p14="http://schemas.microsoft.com/office/powerpoint/2010/main" val="891915913"/>
       </p:ext>
     </p:extLst>
   </p:cSld>
@@ -848,15 +1301,15 @@
         </p:nvSpPr>
         <p:spPr>
           <a:xfrm>
-            <a:off x="2919818" y="7545809"/>
-            <a:ext cx="36910030" cy="12590343"/>
+            <a:off x="2065112" y="10668854"/>
+            <a:ext cx="26105525" cy="17801211"/>
           </a:xfrm>
         </p:spPr>
         <p:txBody>
           <a:bodyPr anchor="b"/>
           <a:lstStyle>
             <a:lvl1pPr>
-              <a:defRPr sz="26480"/>
+              <a:defRPr sz="19861"/>
             </a:lvl1pPr>
           </a:lstStyle>
           <a:p>
@@ -880,8 +1333,8 @@
         </p:nvSpPr>
         <p:spPr>
           <a:xfrm>
-            <a:off x="2919818" y="20255262"/>
-            <a:ext cx="36910030" cy="6620964"/>
+            <a:off x="2065112" y="28638472"/>
+            <a:ext cx="26105525" cy="9361236"/>
           </a:xfrm>
         </p:spPr>
         <p:txBody>
@@ -889,15 +1342,15 @@
           <a:lstStyle>
             <a:lvl1pPr marL="0" indent="0">
               <a:buNone/>
-              <a:defRPr sz="10592">
+              <a:defRPr sz="7944">
                 <a:solidFill>
                   <a:schemeClr val="tx1"/>
                 </a:solidFill>
               </a:defRPr>
             </a:lvl1pPr>
-            <a:lvl2pPr marL="2017806" indent="0">
-              <a:buNone/>
-              <a:defRPr sz="8827">
+            <a:lvl2pPr marL="1513378" indent="0">
+              <a:buNone/>
+              <a:defRPr sz="6620">
                 <a:solidFill>
                   <a:schemeClr val="tx1">
                     <a:tint val="75000"/>
@@ -905,9 +1358,9 @@
                 </a:solidFill>
               </a:defRPr>
             </a:lvl2pPr>
-            <a:lvl3pPr marL="4035613" indent="0">
-              <a:buNone/>
-              <a:defRPr sz="7944">
+            <a:lvl3pPr marL="3026755" indent="0">
+              <a:buNone/>
+              <a:defRPr sz="5958">
                 <a:solidFill>
                   <a:schemeClr val="tx1">
                     <a:tint val="75000"/>
@@ -915,9 +1368,9 @@
                 </a:solidFill>
               </a:defRPr>
             </a:lvl3pPr>
-            <a:lvl4pPr marL="6053419" indent="0">
-              <a:buNone/>
-              <a:defRPr sz="7061">
+            <a:lvl4pPr marL="4540133" indent="0">
+              <a:buNone/>
+              <a:defRPr sz="5296">
                 <a:solidFill>
                   <a:schemeClr val="tx1">
                     <a:tint val="75000"/>
@@ -925,9 +1378,9 @@
                 </a:solidFill>
               </a:defRPr>
             </a:lvl4pPr>
-            <a:lvl5pPr marL="8071226" indent="0">
-              <a:buNone/>
-              <a:defRPr sz="7061">
+            <a:lvl5pPr marL="6053511" indent="0">
+              <a:buNone/>
+              <a:defRPr sz="5296">
                 <a:solidFill>
                   <a:schemeClr val="tx1">
                     <a:tint val="75000"/>
@@ -935,9 +1388,9 @@
                 </a:solidFill>
               </a:defRPr>
             </a:lvl5pPr>
-            <a:lvl6pPr marL="10089032" indent="0">
-              <a:buNone/>
-              <a:defRPr sz="7061">
+            <a:lvl6pPr marL="7566889" indent="0">
+              <a:buNone/>
+              <a:defRPr sz="5296">
                 <a:solidFill>
                   <a:schemeClr val="tx1">
                     <a:tint val="75000"/>
@@ -945,9 +1398,9 @@
                 </a:solidFill>
               </a:defRPr>
             </a:lvl6pPr>
-            <a:lvl7pPr marL="12106839" indent="0">
-              <a:buNone/>
-              <a:defRPr sz="7061">
+            <a:lvl7pPr marL="9080266" indent="0">
+              <a:buNone/>
+              <a:defRPr sz="5296">
                 <a:solidFill>
                   <a:schemeClr val="tx1">
                     <a:tint val="75000"/>
@@ -955,9 +1408,9 @@
                 </a:solidFill>
               </a:defRPr>
             </a:lvl7pPr>
-            <a:lvl8pPr marL="14124645" indent="0">
-              <a:buNone/>
-              <a:defRPr sz="7061">
+            <a:lvl8pPr marL="10593644" indent="0">
+              <a:buNone/>
+              <a:defRPr sz="5296">
                 <a:solidFill>
                   <a:schemeClr val="tx1">
                     <a:tint val="75000"/>
@@ -965,9 +1418,9 @@
                 </a:solidFill>
               </a:defRPr>
             </a:lvl8pPr>
-            <a:lvl9pPr marL="16142452" indent="0">
-              <a:buNone/>
-              <a:defRPr sz="7061">
+            <a:lvl9pPr marL="12107022" indent="0">
+              <a:buNone/>
+              <a:defRPr sz="5296">
                 <a:solidFill>
                   <a:schemeClr val="tx1">
                     <a:tint val="75000"/>
@@ -1002,7 +1455,7 @@
           <a:p>
             <a:fld id="{00DE53A4-4886-8A4E-B0F6-EC4857490DE3}" type="datetimeFigureOut">
               <a:rPr lang="en-US" smtClean="0"/>
-              <a:t>6/24/16</a:t>
+              <a:t>6/27/16</a:t>
             </a:fld>
             <a:endParaRPr lang="en-US"/>
           </a:p>
@@ -1053,7 +1506,7 @@
     </p:spTree>
     <p:extLst>
       <p:ext uri="{BB962C8B-B14F-4D97-AF65-F5344CB8AC3E}">
-        <p14:creationId xmlns:p14="http://schemas.microsoft.com/office/powerpoint/2010/main" val="618792562"/>
+        <p14:creationId xmlns:p14="http://schemas.microsoft.com/office/powerpoint/2010/main" val="994893731"/>
       </p:ext>
     </p:extLst>
   </p:cSld>
@@ -1115,8 +1568,8 @@
         </p:nvSpPr>
         <p:spPr>
           <a:xfrm>
-            <a:off x="2942104" y="8057261"/>
-            <a:ext cx="18187551" cy="19204308"/>
+            <a:off x="2080875" y="11391985"/>
+            <a:ext cx="12863592" cy="27152551"/>
           </a:xfrm>
         </p:spPr>
         <p:txBody>
@@ -1172,8 +1625,8 @@
         </p:nvSpPr>
         <p:spPr>
           <a:xfrm>
-            <a:off x="21664583" y="8057261"/>
-            <a:ext cx="18187551" cy="19204308"/>
+            <a:off x="15322808" y="11391985"/>
+            <a:ext cx="12863592" cy="27152551"/>
           </a:xfrm>
         </p:spPr>
         <p:txBody>
@@ -1234,7 +1687,7 @@
           <a:p>
             <a:fld id="{00DE53A4-4886-8A4E-B0F6-EC4857490DE3}" type="datetimeFigureOut">
               <a:rPr lang="en-US" smtClean="0"/>
-              <a:t>6/24/16</a:t>
+              <a:t>6/27/16</a:t>
             </a:fld>
             <a:endParaRPr lang="en-US"/>
           </a:p>
@@ -1285,7 +1738,7 @@
     </p:spTree>
     <p:extLst>
       <p:ext uri="{BB962C8B-B14F-4D97-AF65-F5344CB8AC3E}">
-        <p14:creationId xmlns:p14="http://schemas.microsoft.com/office/powerpoint/2010/main" val="1930770760"/>
+        <p14:creationId xmlns:p14="http://schemas.microsoft.com/office/powerpoint/2010/main" val="871261375"/>
       </p:ext>
     </p:extLst>
   </p:cSld>
@@ -1324,8 +1777,8 @@
         </p:nvSpPr>
         <p:spPr>
           <a:xfrm>
-            <a:off x="2947678" y="1611459"/>
-            <a:ext cx="36910030" cy="5850274"/>
+            <a:off x="2084817" y="2278406"/>
+            <a:ext cx="26105525" cy="8271575"/>
           </a:xfrm>
         </p:spPr>
         <p:txBody>
@@ -1352,8 +1805,8 @@
         </p:nvSpPr>
         <p:spPr>
           <a:xfrm>
-            <a:off x="2947682" y="7419688"/>
-            <a:ext cx="18103966" cy="3636275"/>
+            <a:off x="2084821" y="10490535"/>
+            <a:ext cx="12804474" cy="5141249"/>
           </a:xfrm>
         </p:spPr>
         <p:txBody>
@@ -1361,39 +1814,39 @@
           <a:lstStyle>
             <a:lvl1pPr marL="0" indent="0">
               <a:buNone/>
-              <a:defRPr sz="10592" b="1"/>
+              <a:defRPr sz="7944" b="1"/>
             </a:lvl1pPr>
-            <a:lvl2pPr marL="2017806" indent="0">
-              <a:buNone/>
-              <a:defRPr sz="8827" b="1"/>
+            <a:lvl2pPr marL="1513378" indent="0">
+              <a:buNone/>
+              <a:defRPr sz="6620" b="1"/>
             </a:lvl2pPr>
-            <a:lvl3pPr marL="4035613" indent="0">
-              <a:buNone/>
-              <a:defRPr sz="7944" b="1"/>
+            <a:lvl3pPr marL="3026755" indent="0">
+              <a:buNone/>
+              <a:defRPr sz="5958" b="1"/>
             </a:lvl3pPr>
-            <a:lvl4pPr marL="6053419" indent="0">
-              <a:buNone/>
-              <a:defRPr sz="7061" b="1"/>
+            <a:lvl4pPr marL="4540133" indent="0">
+              <a:buNone/>
+              <a:defRPr sz="5296" b="1"/>
             </a:lvl4pPr>
-            <a:lvl5pPr marL="8071226" indent="0">
-              <a:buNone/>
-              <a:defRPr sz="7061" b="1"/>
+            <a:lvl5pPr marL="6053511" indent="0">
+              <a:buNone/>
+              <a:defRPr sz="5296" b="1"/>
             </a:lvl5pPr>
-            <a:lvl6pPr marL="10089032" indent="0">
-              <a:buNone/>
-              <a:defRPr sz="7061" b="1"/>
+            <a:lvl6pPr marL="7566889" indent="0">
+              <a:buNone/>
+              <a:defRPr sz="5296" b="1"/>
             </a:lvl6pPr>
-            <a:lvl7pPr marL="12106839" indent="0">
-              <a:buNone/>
-              <a:defRPr sz="7061" b="1"/>
+            <a:lvl7pPr marL="9080266" indent="0">
+              <a:buNone/>
+              <a:defRPr sz="5296" b="1"/>
             </a:lvl7pPr>
-            <a:lvl8pPr marL="14124645" indent="0">
-              <a:buNone/>
-              <a:defRPr sz="7061" b="1"/>
+            <a:lvl8pPr marL="10593644" indent="0">
+              <a:buNone/>
+              <a:defRPr sz="5296" b="1"/>
             </a:lvl8pPr>
-            <a:lvl9pPr marL="16142452" indent="0">
-              <a:buNone/>
-              <a:defRPr sz="7061" b="1"/>
+            <a:lvl9pPr marL="12107022" indent="0">
+              <a:buNone/>
+              <a:defRPr sz="5296" b="1"/>
             </a:lvl9pPr>
           </a:lstStyle>
           <a:p>
@@ -1417,8 +1870,8 @@
         </p:nvSpPr>
         <p:spPr>
           <a:xfrm>
-            <a:off x="2947682" y="11055963"/>
-            <a:ext cx="18103966" cy="16261656"/>
+            <a:off x="2084821" y="15631784"/>
+            <a:ext cx="12804474" cy="22992000"/>
           </a:xfrm>
         </p:spPr>
         <p:txBody>
@@ -1474,8 +1927,8 @@
         </p:nvSpPr>
         <p:spPr>
           <a:xfrm>
-            <a:off x="21664585" y="7419688"/>
-            <a:ext cx="18193125" cy="3636275"/>
+            <a:off x="15322810" y="10490535"/>
+            <a:ext cx="12867534" cy="5141249"/>
           </a:xfrm>
         </p:spPr>
         <p:txBody>
@@ -1483,39 +1936,39 @@
           <a:lstStyle>
             <a:lvl1pPr marL="0" indent="0">
               <a:buNone/>
-              <a:defRPr sz="10592" b="1"/>
+              <a:defRPr sz="7944" b="1"/>
             </a:lvl1pPr>
-            <a:lvl2pPr marL="2017806" indent="0">
-              <a:buNone/>
-              <a:defRPr sz="8827" b="1"/>
+            <a:lvl2pPr marL="1513378" indent="0">
+              <a:buNone/>
+              <a:defRPr sz="6620" b="1"/>
             </a:lvl2pPr>
-            <a:lvl3pPr marL="4035613" indent="0">
-              <a:buNone/>
-              <a:defRPr sz="7944" b="1"/>
+            <a:lvl3pPr marL="3026755" indent="0">
+              <a:buNone/>
+              <a:defRPr sz="5958" b="1"/>
             </a:lvl3pPr>
-            <a:lvl4pPr marL="6053419" indent="0">
-              <a:buNone/>
-              <a:defRPr sz="7061" b="1"/>
+            <a:lvl4pPr marL="4540133" indent="0">
+              <a:buNone/>
+              <a:defRPr sz="5296" b="1"/>
             </a:lvl4pPr>
-            <a:lvl5pPr marL="8071226" indent="0">
-              <a:buNone/>
-              <a:defRPr sz="7061" b="1"/>
+            <a:lvl5pPr marL="6053511" indent="0">
+              <a:buNone/>
+              <a:defRPr sz="5296" b="1"/>
             </a:lvl5pPr>
-            <a:lvl6pPr marL="10089032" indent="0">
-              <a:buNone/>
-              <a:defRPr sz="7061" b="1"/>
+            <a:lvl6pPr marL="7566889" indent="0">
+              <a:buNone/>
+              <a:defRPr sz="5296" b="1"/>
             </a:lvl6pPr>
-            <a:lvl7pPr marL="12106839" indent="0">
-              <a:buNone/>
-              <a:defRPr sz="7061" b="1"/>
+            <a:lvl7pPr marL="9080266" indent="0">
+              <a:buNone/>
+              <a:defRPr sz="5296" b="1"/>
             </a:lvl7pPr>
-            <a:lvl8pPr marL="14124645" indent="0">
-              <a:buNone/>
-              <a:defRPr sz="7061" b="1"/>
+            <a:lvl8pPr marL="10593644" indent="0">
+              <a:buNone/>
+              <a:defRPr sz="5296" b="1"/>
             </a:lvl8pPr>
-            <a:lvl9pPr marL="16142452" indent="0">
-              <a:buNone/>
-              <a:defRPr sz="7061" b="1"/>
+            <a:lvl9pPr marL="12107022" indent="0">
+              <a:buNone/>
+              <a:defRPr sz="5296" b="1"/>
             </a:lvl9pPr>
           </a:lstStyle>
           <a:p>
@@ -1539,8 +1992,8 @@
         </p:nvSpPr>
         <p:spPr>
           <a:xfrm>
-            <a:off x="21664585" y="11055963"/>
-            <a:ext cx="18193125" cy="16261656"/>
+            <a:off x="15322810" y="15631784"/>
+            <a:ext cx="12867534" cy="22992000"/>
           </a:xfrm>
         </p:spPr>
         <p:txBody>
@@ -1601,7 +2054,7 @@
           <a:p>
             <a:fld id="{00DE53A4-4886-8A4E-B0F6-EC4857490DE3}" type="datetimeFigureOut">
               <a:rPr lang="en-US" smtClean="0"/>
-              <a:t>6/24/16</a:t>
+              <a:t>6/27/16</a:t>
             </a:fld>
             <a:endParaRPr lang="en-US"/>
           </a:p>
@@ -1652,7 +2105,7 @@
     </p:spTree>
     <p:extLst>
       <p:ext uri="{BB962C8B-B14F-4D97-AF65-F5344CB8AC3E}">
-        <p14:creationId xmlns:p14="http://schemas.microsoft.com/office/powerpoint/2010/main" val="1986257150"/>
+        <p14:creationId xmlns:p14="http://schemas.microsoft.com/office/powerpoint/2010/main" val="1746424379"/>
       </p:ext>
     </p:extLst>
   </p:cSld>
@@ -1719,7 +2172,7 @@
           <a:p>
             <a:fld id="{00DE53A4-4886-8A4E-B0F6-EC4857490DE3}" type="datetimeFigureOut">
               <a:rPr lang="en-US" smtClean="0"/>
-              <a:t>6/24/16</a:t>
+              <a:t>6/27/16</a:t>
             </a:fld>
             <a:endParaRPr lang="en-US"/>
           </a:p>
@@ -1770,7 +2223,7 @@
     </p:spTree>
     <p:extLst>
       <p:ext uri="{BB962C8B-B14F-4D97-AF65-F5344CB8AC3E}">
-        <p14:creationId xmlns:p14="http://schemas.microsoft.com/office/powerpoint/2010/main" val="390627435"/>
+        <p14:creationId xmlns:p14="http://schemas.microsoft.com/office/powerpoint/2010/main" val="348050657"/>
       </p:ext>
     </p:extLst>
   </p:cSld>
@@ -1814,7 +2267,7 @@
           <a:p>
             <a:fld id="{00DE53A4-4886-8A4E-B0F6-EC4857490DE3}" type="datetimeFigureOut">
               <a:rPr lang="en-US" smtClean="0"/>
-              <a:t>6/24/16</a:t>
+              <a:t>6/27/16</a:t>
             </a:fld>
             <a:endParaRPr lang="en-US"/>
           </a:p>
@@ -1865,7 +2318,7 @@
     </p:spTree>
     <p:extLst>
       <p:ext uri="{BB962C8B-B14F-4D97-AF65-F5344CB8AC3E}">
-        <p14:creationId xmlns:p14="http://schemas.microsoft.com/office/powerpoint/2010/main" val="417791166"/>
+        <p14:creationId xmlns:p14="http://schemas.microsoft.com/office/powerpoint/2010/main" val="2089421418"/>
       </p:ext>
     </p:extLst>
   </p:cSld>
@@ -1904,15 +2357,15 @@
         </p:nvSpPr>
         <p:spPr>
           <a:xfrm>
-            <a:off x="2947678" y="2017818"/>
-            <a:ext cx="13802256" cy="7062364"/>
+            <a:off x="2084817" y="2852949"/>
+            <a:ext cx="9761984" cy="9985322"/>
           </a:xfrm>
         </p:spPr>
         <p:txBody>
           <a:bodyPr anchor="b"/>
           <a:lstStyle>
             <a:lvl1pPr>
-              <a:defRPr sz="14123"/>
+              <a:defRPr sz="10592"/>
             </a:lvl1pPr>
           </a:lstStyle>
           <a:p>
@@ -1936,39 +2389,39 @@
         </p:nvSpPr>
         <p:spPr>
           <a:xfrm>
-            <a:off x="18193125" y="4357934"/>
-            <a:ext cx="21664583" cy="21509383"/>
+            <a:off x="12867534" y="6161587"/>
+            <a:ext cx="15322808" cy="30411646"/>
           </a:xfrm>
         </p:spPr>
         <p:txBody>
           <a:bodyPr/>
           <a:lstStyle>
             <a:lvl1pPr>
-              <a:defRPr sz="14123"/>
+              <a:defRPr sz="10592"/>
             </a:lvl1pPr>
             <a:lvl2pPr>
-              <a:defRPr sz="12358"/>
+              <a:defRPr sz="9268"/>
             </a:lvl2pPr>
             <a:lvl3pPr>
-              <a:defRPr sz="10592"/>
+              <a:defRPr sz="7944"/>
             </a:lvl3pPr>
             <a:lvl4pPr>
-              <a:defRPr sz="8827"/>
+              <a:defRPr sz="6620"/>
             </a:lvl4pPr>
             <a:lvl5pPr>
-              <a:defRPr sz="8827"/>
+              <a:defRPr sz="6620"/>
             </a:lvl5pPr>
             <a:lvl6pPr>
-              <a:defRPr sz="8827"/>
+              <a:defRPr sz="6620"/>
             </a:lvl6pPr>
             <a:lvl7pPr>
-              <a:defRPr sz="8827"/>
+              <a:defRPr sz="6620"/>
             </a:lvl7pPr>
             <a:lvl8pPr>
-              <a:defRPr sz="8827"/>
+              <a:defRPr sz="6620"/>
             </a:lvl8pPr>
             <a:lvl9pPr>
-              <a:defRPr sz="8827"/>
+              <a:defRPr sz="6620"/>
             </a:lvl9pPr>
           </a:lstStyle>
           <a:p>
@@ -2021,8 +2474,8 @@
         </p:nvSpPr>
         <p:spPr>
           <a:xfrm>
-            <a:off x="2947678" y="9080183"/>
-            <a:ext cx="13802256" cy="16822161"/>
+            <a:off x="2084817" y="12838271"/>
+            <a:ext cx="9761984" cy="23784486"/>
           </a:xfrm>
         </p:spPr>
         <p:txBody>
@@ -2030,39 +2483,39 @@
           <a:lstStyle>
             <a:lvl1pPr marL="0" indent="0">
               <a:buNone/>
-              <a:defRPr sz="7061"/>
+              <a:defRPr sz="5296"/>
             </a:lvl1pPr>
-            <a:lvl2pPr marL="2017806" indent="0">
-              <a:buNone/>
-              <a:defRPr sz="6179"/>
+            <a:lvl2pPr marL="1513378" indent="0">
+              <a:buNone/>
+              <a:defRPr sz="4634"/>
             </a:lvl2pPr>
-            <a:lvl3pPr marL="4035613" indent="0">
-              <a:buNone/>
-              <a:defRPr sz="5296"/>
+            <a:lvl3pPr marL="3026755" indent="0">
+              <a:buNone/>
+              <a:defRPr sz="3972"/>
             </a:lvl3pPr>
-            <a:lvl4pPr marL="6053419" indent="0">
-              <a:buNone/>
-              <a:defRPr sz="4413"/>
+            <a:lvl4pPr marL="4540133" indent="0">
+              <a:buNone/>
+              <a:defRPr sz="3310"/>
             </a:lvl4pPr>
-            <a:lvl5pPr marL="8071226" indent="0">
-              <a:buNone/>
-              <a:defRPr sz="4413"/>
+            <a:lvl5pPr marL="6053511" indent="0">
+              <a:buNone/>
+              <a:defRPr sz="3310"/>
             </a:lvl5pPr>
-            <a:lvl6pPr marL="10089032" indent="0">
-              <a:buNone/>
-              <a:defRPr sz="4413"/>
+            <a:lvl6pPr marL="7566889" indent="0">
+              <a:buNone/>
+              <a:defRPr sz="3310"/>
             </a:lvl6pPr>
-            <a:lvl7pPr marL="12106839" indent="0">
-              <a:buNone/>
-              <a:defRPr sz="4413"/>
+            <a:lvl7pPr marL="9080266" indent="0">
+              <a:buNone/>
+              <a:defRPr sz="3310"/>
             </a:lvl7pPr>
-            <a:lvl8pPr marL="14124645" indent="0">
-              <a:buNone/>
-              <a:defRPr sz="4413"/>
+            <a:lvl8pPr marL="10593644" indent="0">
+              <a:buNone/>
+              <a:defRPr sz="3310"/>
             </a:lvl8pPr>
-            <a:lvl9pPr marL="16142452" indent="0">
-              <a:buNone/>
-              <a:defRPr sz="4413"/>
+            <a:lvl9pPr marL="12107022" indent="0">
+              <a:buNone/>
+              <a:defRPr sz="3310"/>
             </a:lvl9pPr>
           </a:lstStyle>
           <a:p>
@@ -2091,7 +2544,7 @@
           <a:p>
             <a:fld id="{00DE53A4-4886-8A4E-B0F6-EC4857490DE3}" type="datetimeFigureOut">
               <a:rPr lang="en-US" smtClean="0"/>
-              <a:t>6/24/16</a:t>
+              <a:t>6/27/16</a:t>
             </a:fld>
             <a:endParaRPr lang="en-US"/>
           </a:p>
@@ -2142,7 +2595,7 @@
     </p:spTree>
     <p:extLst>
       <p:ext uri="{BB962C8B-B14F-4D97-AF65-F5344CB8AC3E}">
-        <p14:creationId xmlns:p14="http://schemas.microsoft.com/office/powerpoint/2010/main" val="1692084919"/>
+        <p14:creationId xmlns:p14="http://schemas.microsoft.com/office/powerpoint/2010/main" val="1253176582"/>
       </p:ext>
     </p:extLst>
   </p:cSld>
@@ -2181,15 +2634,15 @@
         </p:nvSpPr>
         <p:spPr>
           <a:xfrm>
-            <a:off x="2947678" y="2017818"/>
-            <a:ext cx="13802256" cy="7062364"/>
+            <a:off x="2084817" y="2852949"/>
+            <a:ext cx="9761984" cy="9985322"/>
           </a:xfrm>
         </p:spPr>
         <p:txBody>
           <a:bodyPr anchor="b"/>
           <a:lstStyle>
             <a:lvl1pPr>
-              <a:defRPr sz="14123"/>
+              <a:defRPr sz="10592"/>
             </a:lvl1pPr>
           </a:lstStyle>
           <a:p>
@@ -2213,8 +2666,8 @@
         </p:nvSpPr>
         <p:spPr>
           <a:xfrm>
-            <a:off x="18193125" y="4357934"/>
-            <a:ext cx="21664583" cy="21509383"/>
+            <a:off x="12867534" y="6161587"/>
+            <a:ext cx="15322808" cy="30411646"/>
           </a:xfrm>
         </p:spPr>
         <p:txBody>
@@ -2222,39 +2675,39 @@
           <a:lstStyle>
             <a:lvl1pPr marL="0" indent="0">
               <a:buNone/>
-              <a:defRPr sz="14123"/>
+              <a:defRPr sz="10592"/>
             </a:lvl1pPr>
-            <a:lvl2pPr marL="2017806" indent="0">
-              <a:buNone/>
-              <a:defRPr sz="12358"/>
+            <a:lvl2pPr marL="1513378" indent="0">
+              <a:buNone/>
+              <a:defRPr sz="9268"/>
             </a:lvl2pPr>
-            <a:lvl3pPr marL="4035613" indent="0">
-              <a:buNone/>
-              <a:defRPr sz="10592"/>
+            <a:lvl3pPr marL="3026755" indent="0">
+              <a:buNone/>
+              <a:defRPr sz="7944"/>
             </a:lvl3pPr>
-            <a:lvl4pPr marL="6053419" indent="0">
-              <a:buNone/>
-              <a:defRPr sz="8827"/>
+            <a:lvl4pPr marL="4540133" indent="0">
+              <a:buNone/>
+              <a:defRPr sz="6620"/>
             </a:lvl4pPr>
-            <a:lvl5pPr marL="8071226" indent="0">
-              <a:buNone/>
-              <a:defRPr sz="8827"/>
+            <a:lvl5pPr marL="6053511" indent="0">
+              <a:buNone/>
+              <a:defRPr sz="6620"/>
             </a:lvl5pPr>
-            <a:lvl6pPr marL="10089032" indent="0">
-              <a:buNone/>
-              <a:defRPr sz="8827"/>
+            <a:lvl6pPr marL="7566889" indent="0">
+              <a:buNone/>
+              <a:defRPr sz="6620"/>
             </a:lvl6pPr>
-            <a:lvl7pPr marL="12106839" indent="0">
-              <a:buNone/>
-              <a:defRPr sz="8827"/>
+            <a:lvl7pPr marL="9080266" indent="0">
+              <a:buNone/>
+              <a:defRPr sz="6620"/>
             </a:lvl7pPr>
-            <a:lvl8pPr marL="14124645" indent="0">
-              <a:buNone/>
-              <a:defRPr sz="8827"/>
+            <a:lvl8pPr marL="10593644" indent="0">
+              <a:buNone/>
+              <a:defRPr sz="6620"/>
             </a:lvl8pPr>
-            <a:lvl9pPr marL="16142452" indent="0">
-              <a:buNone/>
-              <a:defRPr sz="8827"/>
+            <a:lvl9pPr marL="12107022" indent="0">
+              <a:buNone/>
+              <a:defRPr sz="6620"/>
             </a:lvl9pPr>
           </a:lstStyle>
           <a:p>
@@ -2278,8 +2731,8 @@
         </p:nvSpPr>
         <p:spPr>
           <a:xfrm>
-            <a:off x="2947678" y="9080183"/>
-            <a:ext cx="13802256" cy="16822161"/>
+            <a:off x="2084817" y="12838271"/>
+            <a:ext cx="9761984" cy="23784486"/>
           </a:xfrm>
         </p:spPr>
         <p:txBody>
@@ -2287,39 +2740,39 @@
           <a:lstStyle>
             <a:lvl1pPr marL="0" indent="0">
               <a:buNone/>
-              <a:defRPr sz="7061"/>
+              <a:defRPr sz="5296"/>
             </a:lvl1pPr>
-            <a:lvl2pPr marL="2017806" indent="0">
-              <a:buNone/>
-              <a:defRPr sz="6179"/>
+            <a:lvl2pPr marL="1513378" indent="0">
+              <a:buNone/>
+              <a:defRPr sz="4634"/>
             </a:lvl2pPr>
-            <a:lvl3pPr marL="4035613" indent="0">
-              <a:buNone/>
-              <a:defRPr sz="5296"/>
+            <a:lvl3pPr marL="3026755" indent="0">
+              <a:buNone/>
+              <a:defRPr sz="3972"/>
             </a:lvl3pPr>
-            <a:lvl4pPr marL="6053419" indent="0">
-              <a:buNone/>
-              <a:defRPr sz="4413"/>
+            <a:lvl4pPr marL="4540133" indent="0">
+              <a:buNone/>
+              <a:defRPr sz="3310"/>
             </a:lvl4pPr>
-            <a:lvl5pPr marL="8071226" indent="0">
-              <a:buNone/>
-              <a:defRPr sz="4413"/>
+            <a:lvl5pPr marL="6053511" indent="0">
+              <a:buNone/>
+              <a:defRPr sz="3310"/>
             </a:lvl5pPr>
-            <a:lvl6pPr marL="10089032" indent="0">
-              <a:buNone/>
-              <a:defRPr sz="4413"/>
+            <a:lvl6pPr marL="7566889" indent="0">
+              <a:buNone/>
+              <a:defRPr sz="3310"/>
             </a:lvl6pPr>
-            <a:lvl7pPr marL="12106839" indent="0">
-              <a:buNone/>
-              <a:defRPr sz="4413"/>
+            <a:lvl7pPr marL="9080266" indent="0">
+              <a:buNone/>
+              <a:defRPr sz="3310"/>
             </a:lvl7pPr>
-            <a:lvl8pPr marL="14124645" indent="0">
-              <a:buNone/>
-              <a:defRPr sz="4413"/>
+            <a:lvl8pPr marL="10593644" indent="0">
+              <a:buNone/>
+              <a:defRPr sz="3310"/>
             </a:lvl8pPr>
-            <a:lvl9pPr marL="16142452" indent="0">
-              <a:buNone/>
-              <a:defRPr sz="4413"/>
+            <a:lvl9pPr marL="12107022" indent="0">
+              <a:buNone/>
+              <a:defRPr sz="3310"/>
             </a:lvl9pPr>
           </a:lstStyle>
           <a:p>
@@ -2348,7 +2801,7 @@
           <a:p>
             <a:fld id="{00DE53A4-4886-8A4E-B0F6-EC4857490DE3}" type="datetimeFigureOut">
               <a:rPr lang="en-US" smtClean="0"/>
-              <a:t>6/24/16</a:t>
+              <a:t>6/27/16</a:t>
             </a:fld>
             <a:endParaRPr lang="en-US"/>
           </a:p>
@@ -2399,7 +2852,7 @@
     </p:spTree>
     <p:extLst>
       <p:ext uri="{BB962C8B-B14F-4D97-AF65-F5344CB8AC3E}">
-        <p14:creationId xmlns:p14="http://schemas.microsoft.com/office/powerpoint/2010/main" val="1892780059"/>
+        <p14:creationId xmlns:p14="http://schemas.microsoft.com/office/powerpoint/2010/main" val="1766687545"/>
       </p:ext>
     </p:extLst>
   </p:cSld>
@@ -2443,8 +2896,8 @@
         </p:nvSpPr>
         <p:spPr>
           <a:xfrm>
-            <a:off x="2942104" y="1611459"/>
-            <a:ext cx="36910030" cy="5850274"/>
+            <a:off x="2080875" y="2278406"/>
+            <a:ext cx="26105525" cy="8271575"/>
           </a:xfrm>
           <a:prstGeom prst="rect">
             <a:avLst/>
@@ -2476,8 +2929,8 @@
         </p:nvSpPr>
         <p:spPr>
           <a:xfrm>
-            <a:off x="2942104" y="8057261"/>
-            <a:ext cx="36910030" cy="19204308"/>
+            <a:off x="2080875" y="11391985"/>
+            <a:ext cx="26105525" cy="27152551"/>
           </a:xfrm>
           <a:prstGeom prst="rect">
             <a:avLst/>
@@ -2538,8 +2991,8 @@
         </p:nvSpPr>
         <p:spPr>
           <a:xfrm>
-            <a:off x="2942104" y="28053287"/>
-            <a:ext cx="9628704" cy="1611452"/>
+            <a:off x="2080875" y="39663928"/>
+            <a:ext cx="6810137" cy="2278397"/>
           </a:xfrm>
           <a:prstGeom prst="rect">
             <a:avLst/>
@@ -2549,7 +3002,7 @@
           <a:bodyPr vert="horz" lIns="91440" tIns="45720" rIns="91440" bIns="45720" rtlCol="0" anchor="ctr"/>
           <a:lstStyle>
             <a:lvl1pPr algn="l">
-              <a:defRPr sz="5296">
+              <a:defRPr sz="3972">
                 <a:solidFill>
                   <a:schemeClr val="tx1">
                     <a:tint val="75000"/>
@@ -2561,7 +3014,7 @@
           <a:p>
             <a:fld id="{00DE53A4-4886-8A4E-B0F6-EC4857490DE3}" type="datetimeFigureOut">
               <a:rPr lang="en-US" smtClean="0"/>
-              <a:t>6/24/16</a:t>
+              <a:t>6/27/16</a:t>
             </a:fld>
             <a:endParaRPr lang="en-US"/>
           </a:p>
@@ -2579,8 +3032,8 @@
         </p:nvSpPr>
         <p:spPr>
           <a:xfrm>
-            <a:off x="14175592" y="28053287"/>
-            <a:ext cx="14443055" cy="1611452"/>
+            <a:off x="10026035" y="39663928"/>
+            <a:ext cx="10215205" cy="2278397"/>
           </a:xfrm>
           <a:prstGeom prst="rect">
             <a:avLst/>
@@ -2590,7 +3043,7 @@
           <a:bodyPr vert="horz" lIns="91440" tIns="45720" rIns="91440" bIns="45720" rtlCol="0" anchor="ctr"/>
           <a:lstStyle>
             <a:lvl1pPr algn="ctr">
-              <a:defRPr sz="5296">
+              <a:defRPr sz="3972">
                 <a:solidFill>
                   <a:schemeClr val="tx1">
                     <a:tint val="75000"/>
@@ -2616,8 +3069,8 @@
         </p:nvSpPr>
         <p:spPr>
           <a:xfrm>
-            <a:off x="30223430" y="28053287"/>
-            <a:ext cx="9628704" cy="1611452"/>
+            <a:off x="21376263" y="39663928"/>
+            <a:ext cx="6810137" cy="2278397"/>
           </a:xfrm>
           <a:prstGeom prst="rect">
             <a:avLst/>
@@ -2627,7 +3080,7 @@
           <a:bodyPr vert="horz" lIns="91440" tIns="45720" rIns="91440" bIns="45720" rtlCol="0" anchor="ctr"/>
           <a:lstStyle>
             <a:lvl1pPr algn="r">
-              <a:defRPr sz="5296">
+              <a:defRPr sz="3972">
                 <a:solidFill>
                   <a:schemeClr val="tx1">
                     <a:tint val="75000"/>
@@ -2648,27 +3101,27 @@
     </p:spTree>
     <p:extLst>
       <p:ext uri="{BB962C8B-B14F-4D97-AF65-F5344CB8AC3E}">
-        <p14:creationId xmlns:p14="http://schemas.microsoft.com/office/powerpoint/2010/main" val="322211369"/>
+        <p14:creationId xmlns:p14="http://schemas.microsoft.com/office/powerpoint/2010/main" val="1721392701"/>
       </p:ext>
     </p:extLst>
   </p:cSld>
   <p:clrMap bg1="lt1" tx1="dk1" bg2="lt2" tx2="dk2" accent1="accent1" accent2="accent2" accent3="accent3" accent4="accent4" accent5="accent5" accent6="accent6" hlink="hlink" folHlink="folHlink"/>
   <p:sldLayoutIdLst>
-    <p:sldLayoutId id="2147483673" r:id="rId1"/>
-    <p:sldLayoutId id="2147483674" r:id="rId2"/>
-    <p:sldLayoutId id="2147483675" r:id="rId3"/>
-    <p:sldLayoutId id="2147483676" r:id="rId4"/>
-    <p:sldLayoutId id="2147483677" r:id="rId5"/>
-    <p:sldLayoutId id="2147483678" r:id="rId6"/>
-    <p:sldLayoutId id="2147483679" r:id="rId7"/>
-    <p:sldLayoutId id="2147483680" r:id="rId8"/>
-    <p:sldLayoutId id="2147483681" r:id="rId9"/>
-    <p:sldLayoutId id="2147483682" r:id="rId10"/>
-    <p:sldLayoutId id="2147483683" r:id="rId11"/>
+    <p:sldLayoutId id="2147483685" r:id="rId1"/>
+    <p:sldLayoutId id="2147483686" r:id="rId2"/>
+    <p:sldLayoutId id="2147483687" r:id="rId3"/>
+    <p:sldLayoutId id="2147483688" r:id="rId4"/>
+    <p:sldLayoutId id="2147483689" r:id="rId5"/>
+    <p:sldLayoutId id="2147483690" r:id="rId6"/>
+    <p:sldLayoutId id="2147483691" r:id="rId7"/>
+    <p:sldLayoutId id="2147483692" r:id="rId8"/>
+    <p:sldLayoutId id="2147483693" r:id="rId9"/>
+    <p:sldLayoutId id="2147483694" r:id="rId10"/>
+    <p:sldLayoutId id="2147483695" r:id="rId11"/>
   </p:sldLayoutIdLst>
   <p:txStyles>
     <p:titleStyle>
-      <a:lvl1pPr algn="l" defTabSz="4035613" rtl="0" eaLnBrk="1" latinLnBrk="0" hangingPunct="1">
+      <a:lvl1pPr algn="l" defTabSz="3026755" rtl="0" eaLnBrk="1" latinLnBrk="0" hangingPunct="1">
         <a:lnSpc>
           <a:spcPct val="90000"/>
         </a:lnSpc>
@@ -2676,7 +3129,7 @@
           <a:spcPct val="0"/>
         </a:spcBef>
         <a:buNone/>
-        <a:defRPr sz="19419" kern="1200">
+        <a:defRPr sz="14564" kern="1200">
           <a:solidFill>
             <a:schemeClr val="tx1"/>
           </a:solidFill>
@@ -2687,16 +3140,16 @@
       </a:lvl1pPr>
     </p:titleStyle>
     <p:bodyStyle>
-      <a:lvl1pPr marL="1008903" indent="-1008903" algn="l" defTabSz="4035613" rtl="0" eaLnBrk="1" latinLnBrk="0" hangingPunct="1">
+      <a:lvl1pPr marL="756689" indent="-756689" algn="l" defTabSz="3026755" rtl="0" eaLnBrk="1" latinLnBrk="0" hangingPunct="1">
         <a:lnSpc>
           <a:spcPct val="90000"/>
         </a:lnSpc>
         <a:spcBef>
-          <a:spcPts val="4413"/>
+          <a:spcPts val="3310"/>
         </a:spcBef>
         <a:buFont typeface="Arial" panose="020B0604020202020204" pitchFamily="34" charset="0"/>
         <a:buChar char="•"/>
-        <a:defRPr sz="12358" kern="1200">
+        <a:defRPr sz="9268" kern="1200">
           <a:solidFill>
             <a:schemeClr val="tx1"/>
           </a:solidFill>
@@ -2705,48 +3158,12 @@
           <a:cs typeface="+mn-cs"/>
         </a:defRPr>
       </a:lvl1pPr>
-      <a:lvl2pPr marL="3026710" indent="-1008903" algn="l" defTabSz="4035613" rtl="0" eaLnBrk="1" latinLnBrk="0" hangingPunct="1">
+      <a:lvl2pPr marL="2270067" indent="-756689" algn="l" defTabSz="3026755" rtl="0" eaLnBrk="1" latinLnBrk="0" hangingPunct="1">
         <a:lnSpc>
           <a:spcPct val="90000"/>
         </a:lnSpc>
         <a:spcBef>
-          <a:spcPts val="2207"/>
-        </a:spcBef>
-        <a:buFont typeface="Arial" panose="020B0604020202020204" pitchFamily="34" charset="0"/>
-        <a:buChar char="•"/>
-        <a:defRPr sz="10592" kern="1200">
-          <a:solidFill>
-            <a:schemeClr val="tx1"/>
-          </a:solidFill>
-          <a:latin typeface="+mn-lt"/>
-          <a:ea typeface="+mn-ea"/>
-          <a:cs typeface="+mn-cs"/>
-        </a:defRPr>
-      </a:lvl2pPr>
-      <a:lvl3pPr marL="5044516" indent="-1008903" algn="l" defTabSz="4035613" rtl="0" eaLnBrk="1" latinLnBrk="0" hangingPunct="1">
-        <a:lnSpc>
-          <a:spcPct val="90000"/>
-        </a:lnSpc>
-        <a:spcBef>
-          <a:spcPts val="2207"/>
-        </a:spcBef>
-        <a:buFont typeface="Arial" panose="020B0604020202020204" pitchFamily="34" charset="0"/>
-        <a:buChar char="•"/>
-        <a:defRPr sz="8827" kern="1200">
-          <a:solidFill>
-            <a:schemeClr val="tx1"/>
-          </a:solidFill>
-          <a:latin typeface="+mn-lt"/>
-          <a:ea typeface="+mn-ea"/>
-          <a:cs typeface="+mn-cs"/>
-        </a:defRPr>
-      </a:lvl3pPr>
-      <a:lvl4pPr marL="7062323" indent="-1008903" algn="l" defTabSz="4035613" rtl="0" eaLnBrk="1" latinLnBrk="0" hangingPunct="1">
-        <a:lnSpc>
-          <a:spcPct val="90000"/>
-        </a:lnSpc>
-        <a:spcBef>
-          <a:spcPts val="2207"/>
+          <a:spcPts val="1655"/>
         </a:spcBef>
         <a:buFont typeface="Arial" panose="020B0604020202020204" pitchFamily="34" charset="0"/>
         <a:buChar char="•"/>
@@ -2758,17 +3175,53 @@
           <a:ea typeface="+mn-ea"/>
           <a:cs typeface="+mn-cs"/>
         </a:defRPr>
-      </a:lvl4pPr>
-      <a:lvl5pPr marL="9080129" indent="-1008903" algn="l" defTabSz="4035613" rtl="0" eaLnBrk="1" latinLnBrk="0" hangingPunct="1">
+      </a:lvl2pPr>
+      <a:lvl3pPr marL="3783444" indent="-756689" algn="l" defTabSz="3026755" rtl="0" eaLnBrk="1" latinLnBrk="0" hangingPunct="1">
         <a:lnSpc>
           <a:spcPct val="90000"/>
         </a:lnSpc>
         <a:spcBef>
-          <a:spcPts val="2207"/>
+          <a:spcPts val="1655"/>
         </a:spcBef>
         <a:buFont typeface="Arial" panose="020B0604020202020204" pitchFamily="34" charset="0"/>
         <a:buChar char="•"/>
-        <a:defRPr sz="7944" kern="1200">
+        <a:defRPr sz="6620" kern="1200">
+          <a:solidFill>
+            <a:schemeClr val="tx1"/>
+          </a:solidFill>
+          <a:latin typeface="+mn-lt"/>
+          <a:ea typeface="+mn-ea"/>
+          <a:cs typeface="+mn-cs"/>
+        </a:defRPr>
+      </a:lvl3pPr>
+      <a:lvl4pPr marL="5296822" indent="-756689" algn="l" defTabSz="3026755" rtl="0" eaLnBrk="1" latinLnBrk="0" hangingPunct="1">
+        <a:lnSpc>
+          <a:spcPct val="90000"/>
+        </a:lnSpc>
+        <a:spcBef>
+          <a:spcPts val="1655"/>
+        </a:spcBef>
+        <a:buFont typeface="Arial" panose="020B0604020202020204" pitchFamily="34" charset="0"/>
+        <a:buChar char="•"/>
+        <a:defRPr sz="5958" kern="1200">
+          <a:solidFill>
+            <a:schemeClr val="tx1"/>
+          </a:solidFill>
+          <a:latin typeface="+mn-lt"/>
+          <a:ea typeface="+mn-ea"/>
+          <a:cs typeface="+mn-cs"/>
+        </a:defRPr>
+      </a:lvl4pPr>
+      <a:lvl5pPr marL="6810200" indent="-756689" algn="l" defTabSz="3026755" rtl="0" eaLnBrk="1" latinLnBrk="0" hangingPunct="1">
+        <a:lnSpc>
+          <a:spcPct val="90000"/>
+        </a:lnSpc>
+        <a:spcBef>
+          <a:spcPts val="1655"/>
+        </a:spcBef>
+        <a:buFont typeface="Arial" panose="020B0604020202020204" pitchFamily="34" charset="0"/>
+        <a:buChar char="•"/>
+        <a:defRPr sz="5958" kern="1200">
           <a:solidFill>
             <a:schemeClr val="tx1"/>
           </a:solidFill>
@@ -2777,16 +3230,16 @@
           <a:cs typeface="+mn-cs"/>
         </a:defRPr>
       </a:lvl5pPr>
-      <a:lvl6pPr marL="11097936" indent="-1008903" algn="l" defTabSz="4035613" rtl="0" eaLnBrk="1" latinLnBrk="0" hangingPunct="1">
+      <a:lvl6pPr marL="8323577" indent="-756689" algn="l" defTabSz="3026755" rtl="0" eaLnBrk="1" latinLnBrk="0" hangingPunct="1">
         <a:lnSpc>
           <a:spcPct val="90000"/>
         </a:lnSpc>
         <a:spcBef>
-          <a:spcPts val="2207"/>
+          <a:spcPts val="1655"/>
         </a:spcBef>
         <a:buFont typeface="Arial" panose="020B0604020202020204" pitchFamily="34" charset="0"/>
         <a:buChar char="•"/>
-        <a:defRPr sz="7944" kern="1200">
+        <a:defRPr sz="5958" kern="1200">
           <a:solidFill>
             <a:schemeClr val="tx1"/>
           </a:solidFill>
@@ -2795,16 +3248,16 @@
           <a:cs typeface="+mn-cs"/>
         </a:defRPr>
       </a:lvl6pPr>
-      <a:lvl7pPr marL="13115742" indent="-1008903" algn="l" defTabSz="4035613" rtl="0" eaLnBrk="1" latinLnBrk="0" hangingPunct="1">
+      <a:lvl7pPr marL="9836955" indent="-756689" algn="l" defTabSz="3026755" rtl="0" eaLnBrk="1" latinLnBrk="0" hangingPunct="1">
         <a:lnSpc>
           <a:spcPct val="90000"/>
         </a:lnSpc>
         <a:spcBef>
-          <a:spcPts val="2207"/>
+          <a:spcPts val="1655"/>
         </a:spcBef>
         <a:buFont typeface="Arial" panose="020B0604020202020204" pitchFamily="34" charset="0"/>
         <a:buChar char="•"/>
-        <a:defRPr sz="7944" kern="1200">
+        <a:defRPr sz="5958" kern="1200">
           <a:solidFill>
             <a:schemeClr val="tx1"/>
           </a:solidFill>
@@ -2813,16 +3266,16 @@
           <a:cs typeface="+mn-cs"/>
         </a:defRPr>
       </a:lvl7pPr>
-      <a:lvl8pPr marL="15133549" indent="-1008903" algn="l" defTabSz="4035613" rtl="0" eaLnBrk="1" latinLnBrk="0" hangingPunct="1">
+      <a:lvl8pPr marL="11350333" indent="-756689" algn="l" defTabSz="3026755" rtl="0" eaLnBrk="1" latinLnBrk="0" hangingPunct="1">
         <a:lnSpc>
           <a:spcPct val="90000"/>
         </a:lnSpc>
         <a:spcBef>
-          <a:spcPts val="2207"/>
+          <a:spcPts val="1655"/>
         </a:spcBef>
         <a:buFont typeface="Arial" panose="020B0604020202020204" pitchFamily="34" charset="0"/>
         <a:buChar char="•"/>
-        <a:defRPr sz="7944" kern="1200">
+        <a:defRPr sz="5958" kern="1200">
           <a:solidFill>
             <a:schemeClr val="tx1"/>
           </a:solidFill>
@@ -2831,16 +3284,16 @@
           <a:cs typeface="+mn-cs"/>
         </a:defRPr>
       </a:lvl8pPr>
-      <a:lvl9pPr marL="17151355" indent="-1008903" algn="l" defTabSz="4035613" rtl="0" eaLnBrk="1" latinLnBrk="0" hangingPunct="1">
+      <a:lvl9pPr marL="12863711" indent="-756689" algn="l" defTabSz="3026755" rtl="0" eaLnBrk="1" latinLnBrk="0" hangingPunct="1">
         <a:lnSpc>
           <a:spcPct val="90000"/>
         </a:lnSpc>
         <a:spcBef>
-          <a:spcPts val="2207"/>
+          <a:spcPts val="1655"/>
         </a:spcBef>
         <a:buFont typeface="Arial" panose="020B0604020202020204" pitchFamily="34" charset="0"/>
         <a:buChar char="•"/>
-        <a:defRPr sz="7944" kern="1200">
+        <a:defRPr sz="5958" kern="1200">
           <a:solidFill>
             <a:schemeClr val="tx1"/>
           </a:solidFill>
@@ -2854,8 +3307,8 @@
       <a:defPPr>
         <a:defRPr lang="en-US"/>
       </a:defPPr>
-      <a:lvl1pPr marL="0" algn="l" defTabSz="4035613" rtl="0" eaLnBrk="1" latinLnBrk="0" hangingPunct="1">
-        <a:defRPr sz="7944" kern="1200">
+      <a:lvl1pPr marL="0" algn="l" defTabSz="3026755" rtl="0" eaLnBrk="1" latinLnBrk="0" hangingPunct="1">
+        <a:defRPr sz="5958" kern="1200">
           <a:solidFill>
             <a:schemeClr val="tx1"/>
           </a:solidFill>
@@ -2864,8 +3317,8 @@
           <a:cs typeface="+mn-cs"/>
         </a:defRPr>
       </a:lvl1pPr>
-      <a:lvl2pPr marL="2017806" algn="l" defTabSz="4035613" rtl="0" eaLnBrk="1" latinLnBrk="0" hangingPunct="1">
-        <a:defRPr sz="7944" kern="1200">
+      <a:lvl2pPr marL="1513378" algn="l" defTabSz="3026755" rtl="0" eaLnBrk="1" latinLnBrk="0" hangingPunct="1">
+        <a:defRPr sz="5958" kern="1200">
           <a:solidFill>
             <a:schemeClr val="tx1"/>
           </a:solidFill>
@@ -2874,8 +3327,8 @@
           <a:cs typeface="+mn-cs"/>
         </a:defRPr>
       </a:lvl2pPr>
-      <a:lvl3pPr marL="4035613" algn="l" defTabSz="4035613" rtl="0" eaLnBrk="1" latinLnBrk="0" hangingPunct="1">
-        <a:defRPr sz="7944" kern="1200">
+      <a:lvl3pPr marL="3026755" algn="l" defTabSz="3026755" rtl="0" eaLnBrk="1" latinLnBrk="0" hangingPunct="1">
+        <a:defRPr sz="5958" kern="1200">
           <a:solidFill>
             <a:schemeClr val="tx1"/>
           </a:solidFill>
@@ -2884,8 +3337,8 @@
           <a:cs typeface="+mn-cs"/>
         </a:defRPr>
       </a:lvl3pPr>
-      <a:lvl4pPr marL="6053419" algn="l" defTabSz="4035613" rtl="0" eaLnBrk="1" latinLnBrk="0" hangingPunct="1">
-        <a:defRPr sz="7944" kern="1200">
+      <a:lvl4pPr marL="4540133" algn="l" defTabSz="3026755" rtl="0" eaLnBrk="1" latinLnBrk="0" hangingPunct="1">
+        <a:defRPr sz="5958" kern="1200">
           <a:solidFill>
             <a:schemeClr val="tx1"/>
           </a:solidFill>
@@ -2894,8 +3347,8 @@
           <a:cs typeface="+mn-cs"/>
         </a:defRPr>
       </a:lvl4pPr>
-      <a:lvl5pPr marL="8071226" algn="l" defTabSz="4035613" rtl="0" eaLnBrk="1" latinLnBrk="0" hangingPunct="1">
-        <a:defRPr sz="7944" kern="1200">
+      <a:lvl5pPr marL="6053511" algn="l" defTabSz="3026755" rtl="0" eaLnBrk="1" latinLnBrk="0" hangingPunct="1">
+        <a:defRPr sz="5958" kern="1200">
           <a:solidFill>
             <a:schemeClr val="tx1"/>
           </a:solidFill>
@@ -2904,8 +3357,8 @@
           <a:cs typeface="+mn-cs"/>
         </a:defRPr>
       </a:lvl5pPr>
-      <a:lvl6pPr marL="10089032" algn="l" defTabSz="4035613" rtl="0" eaLnBrk="1" latinLnBrk="0" hangingPunct="1">
-        <a:defRPr sz="7944" kern="1200">
+      <a:lvl6pPr marL="7566889" algn="l" defTabSz="3026755" rtl="0" eaLnBrk="1" latinLnBrk="0" hangingPunct="1">
+        <a:defRPr sz="5958" kern="1200">
           <a:solidFill>
             <a:schemeClr val="tx1"/>
           </a:solidFill>
@@ -2914,8 +3367,8 @@
           <a:cs typeface="+mn-cs"/>
         </a:defRPr>
       </a:lvl6pPr>
-      <a:lvl7pPr marL="12106839" algn="l" defTabSz="4035613" rtl="0" eaLnBrk="1" latinLnBrk="0" hangingPunct="1">
-        <a:defRPr sz="7944" kern="1200">
+      <a:lvl7pPr marL="9080266" algn="l" defTabSz="3026755" rtl="0" eaLnBrk="1" latinLnBrk="0" hangingPunct="1">
+        <a:defRPr sz="5958" kern="1200">
           <a:solidFill>
             <a:schemeClr val="tx1"/>
           </a:solidFill>
@@ -2924,8 +3377,8 @@
           <a:cs typeface="+mn-cs"/>
         </a:defRPr>
       </a:lvl7pPr>
-      <a:lvl8pPr marL="14124645" algn="l" defTabSz="4035613" rtl="0" eaLnBrk="1" latinLnBrk="0" hangingPunct="1">
-        <a:defRPr sz="7944" kern="1200">
+      <a:lvl8pPr marL="10593644" algn="l" defTabSz="3026755" rtl="0" eaLnBrk="1" latinLnBrk="0" hangingPunct="1">
+        <a:defRPr sz="5958" kern="1200">
           <a:solidFill>
             <a:schemeClr val="tx1"/>
           </a:solidFill>
@@ -2934,8 +3387,8 @@
           <a:cs typeface="+mn-cs"/>
         </a:defRPr>
       </a:lvl8pPr>
-      <a:lvl9pPr marL="16142452" algn="l" defTabSz="4035613" rtl="0" eaLnBrk="1" latinLnBrk="0" hangingPunct="1">
-        <a:defRPr sz="7944" kern="1200">
+      <a:lvl9pPr marL="12107022" algn="l" defTabSz="3026755" rtl="0" eaLnBrk="1" latinLnBrk="0" hangingPunct="1">
+        <a:defRPr sz="5958" kern="1200">
           <a:solidFill>
             <a:schemeClr val="tx1"/>
           </a:solidFill>
@@ -2987,6 +3440,1598 @@
           <a:chExt cx="0" cy="0"/>
         </a:xfrm>
       </p:grpSpPr>
+      <p:sp>
+        <p:nvSpPr>
+          <p:cNvPr id="44" name="Rounded Rectangle 43"/>
+          <p:cNvSpPr/>
+          <p:nvPr/>
+        </p:nvSpPr>
+        <p:spPr>
+          <a:xfrm>
+            <a:off x="350837" y="13075221"/>
+            <a:ext cx="14478000" cy="13503497"/>
+          </a:xfrm>
+          <a:prstGeom prst="roundRect">
+            <a:avLst>
+              <a:gd name="adj" fmla="val 1166"/>
+            </a:avLst>
+          </a:prstGeom>
+          <a:solidFill>
+            <a:srgbClr val="FBFAFC"/>
+          </a:solidFill>
+          <a:ln w="63500" cap="rnd">
+            <a:solidFill>
+              <a:schemeClr val="tx2">
+                <a:lumMod val="75000"/>
+                <a:alpha val="87000"/>
+              </a:schemeClr>
+            </a:solidFill>
+            <a:bevel/>
+          </a:ln>
+        </p:spPr>
+        <p:style>
+          <a:lnRef idx="2">
+            <a:schemeClr val="accent1">
+              <a:shade val="50000"/>
+            </a:schemeClr>
+          </a:lnRef>
+          <a:fillRef idx="1">
+            <a:schemeClr val="accent1"/>
+          </a:fillRef>
+          <a:effectRef idx="0">
+            <a:schemeClr val="accent1"/>
+          </a:effectRef>
+          <a:fontRef idx="minor">
+            <a:schemeClr val="lt1"/>
+          </a:fontRef>
+        </p:style>
+        <p:txBody>
+          <a:bodyPr rtlCol="0" anchor="ctr"/>
+          <a:lstStyle/>
+          <a:p>
+            <a:pPr algn="ctr"/>
+            <a:endParaRPr lang="en-US" sz="4882"/>
+          </a:p>
+        </p:txBody>
+      </p:sp>
+      <p:sp>
+        <p:nvSpPr>
+          <p:cNvPr id="12" name="Rectangle 11"/>
+          <p:cNvSpPr/>
+          <p:nvPr/>
+        </p:nvSpPr>
+        <p:spPr>
+          <a:xfrm>
+            <a:off x="717748" y="13193037"/>
+            <a:ext cx="9108140" cy="830997"/>
+          </a:xfrm>
+          <a:prstGeom prst="rect">
+            <a:avLst/>
+          </a:prstGeom>
+        </p:spPr>
+        <p:txBody>
+          <a:bodyPr wrap="square">
+            <a:spAutoFit/>
+          </a:bodyPr>
+          <a:lstStyle/>
+          <a:p>
+            <a:r>
+              <a:rPr lang="en-US" sz="4800" dirty="0">
+                <a:solidFill>
+                  <a:schemeClr val="tx2">
+                    <a:lumMod val="75000"/>
+                  </a:schemeClr>
+                </a:solidFill>
+              </a:rPr>
+              <a:t>Motivation</a:t>
+            </a:r>
+            <a:endParaRPr lang="en-US" sz="4800" dirty="0">
+              <a:solidFill>
+                <a:schemeClr val="tx2">
+                  <a:lumMod val="75000"/>
+                </a:schemeClr>
+              </a:solidFill>
+            </a:endParaRPr>
+          </a:p>
+        </p:txBody>
+      </p:sp>
+      <p:sp>
+        <p:nvSpPr>
+          <p:cNvPr id="27" name="Action Button: Movie 26">
+            <a:hlinkClick r:id="" action="ppaction://noaction" highlightClick="1"/>
+          </p:cNvPr>
+          <p:cNvSpPr/>
+          <p:nvPr/>
+        </p:nvSpPr>
+        <p:spPr>
+          <a:xfrm>
+            <a:off x="-8995622" y="13983137"/>
+            <a:ext cx="592838" cy="592838"/>
+          </a:xfrm>
+          <a:prstGeom prst="actionButtonMovie">
+            <a:avLst/>
+          </a:prstGeom>
+        </p:spPr>
+        <p:style>
+          <a:lnRef idx="2">
+            <a:schemeClr val="accent1">
+              <a:shade val="50000"/>
+            </a:schemeClr>
+          </a:lnRef>
+          <a:fillRef idx="1">
+            <a:schemeClr val="accent1"/>
+          </a:fillRef>
+          <a:effectRef idx="0">
+            <a:schemeClr val="accent1"/>
+          </a:effectRef>
+          <a:fontRef idx="minor">
+            <a:schemeClr val="lt1"/>
+          </a:fontRef>
+        </p:style>
+        <p:txBody>
+          <a:bodyPr rtlCol="0" anchor="ctr"/>
+          <a:lstStyle/>
+          <a:p>
+            <a:pPr algn="ctr"/>
+            <a:endParaRPr lang="en-US" sz="4882"/>
+          </a:p>
+        </p:txBody>
+      </p:sp>
+      <p:sp>
+        <p:nvSpPr>
+          <p:cNvPr id="28" name="TextBox 27"/>
+          <p:cNvSpPr txBox="1"/>
+          <p:nvPr/>
+        </p:nvSpPr>
+        <p:spPr>
+          <a:xfrm>
+            <a:off x="-8305661" y="14001705"/>
+            <a:ext cx="8040920" cy="571247"/>
+          </a:xfrm>
+          <a:prstGeom prst="rect">
+            <a:avLst/>
+          </a:prstGeom>
+          <a:noFill/>
+        </p:spPr>
+        <p:txBody>
+          <a:bodyPr wrap="square" rtlCol="0">
+            <a:spAutoFit/>
+          </a:bodyPr>
+          <a:lstStyle/>
+          <a:p>
+            <a:r>
+              <a:rPr lang="en-US" sz="3112" dirty="0"/>
+              <a:t>CDP/FSSP and/or CIP schematic</a:t>
+            </a:r>
+            <a:endParaRPr lang="en-US" sz="3112" dirty="0"/>
+          </a:p>
+        </p:txBody>
+      </p:sp>
+      <p:sp>
+        <p:nvSpPr>
+          <p:cNvPr id="40" name="Action Button: Movie 39">
+            <a:hlinkClick r:id="" action="ppaction://noaction" highlightClick="1"/>
+          </p:cNvPr>
+          <p:cNvSpPr/>
+          <p:nvPr/>
+        </p:nvSpPr>
+        <p:spPr>
+          <a:xfrm>
+            <a:off x="-8995622" y="14963065"/>
+            <a:ext cx="592838" cy="592838"/>
+          </a:xfrm>
+          <a:prstGeom prst="actionButtonMovie">
+            <a:avLst/>
+          </a:prstGeom>
+        </p:spPr>
+        <p:style>
+          <a:lnRef idx="2">
+            <a:schemeClr val="accent1">
+              <a:shade val="50000"/>
+            </a:schemeClr>
+          </a:lnRef>
+          <a:fillRef idx="1">
+            <a:schemeClr val="accent1"/>
+          </a:fillRef>
+          <a:effectRef idx="0">
+            <a:schemeClr val="accent1"/>
+          </a:effectRef>
+          <a:fontRef idx="minor">
+            <a:schemeClr val="lt1"/>
+          </a:fontRef>
+        </p:style>
+        <p:txBody>
+          <a:bodyPr rtlCol="0" anchor="ctr"/>
+          <a:lstStyle/>
+          <a:p>
+            <a:pPr algn="ctr"/>
+            <a:endParaRPr lang="en-US" sz="4882"/>
+          </a:p>
+        </p:txBody>
+      </p:sp>
+      <p:sp>
+        <p:nvSpPr>
+          <p:cNvPr id="41" name="TextBox 40"/>
+          <p:cNvSpPr txBox="1"/>
+          <p:nvPr/>
+        </p:nvSpPr>
+        <p:spPr>
+          <a:xfrm>
+            <a:off x="-8305661" y="14981633"/>
+            <a:ext cx="8040920" cy="1050159"/>
+          </a:xfrm>
+          <a:prstGeom prst="rect">
+            <a:avLst/>
+          </a:prstGeom>
+          <a:noFill/>
+        </p:spPr>
+        <p:txBody>
+          <a:bodyPr wrap="square" rtlCol="0">
+            <a:spAutoFit/>
+          </a:bodyPr>
+          <a:lstStyle/>
+          <a:p>
+            <a:r>
+              <a:rPr lang="en-US" sz="3112" dirty="0"/>
+              <a:t>[Could] include </a:t>
+            </a:r>
+            <a:r>
+              <a:rPr lang="en-US" sz="3112" dirty="0" err="1"/>
+              <a:t>metcam</a:t>
+            </a:r>
+            <a:r>
+              <a:rPr lang="en-US" sz="3112" dirty="0"/>
+              <a:t> photo of glass beads (to show volume/placement imprecision) </a:t>
+            </a:r>
+            <a:endParaRPr lang="en-US" sz="3112" dirty="0"/>
+          </a:p>
+        </p:txBody>
+      </p:sp>
+      <p:sp>
+        <p:nvSpPr>
+          <p:cNvPr id="3" name="Rounded Rectangle 2"/>
+          <p:cNvSpPr/>
+          <p:nvPr/>
+        </p:nvSpPr>
+        <p:spPr>
+          <a:xfrm>
+            <a:off x="350837" y="4042035"/>
+            <a:ext cx="14478000" cy="8515884"/>
+          </a:xfrm>
+          <a:prstGeom prst="roundRect">
+            <a:avLst>
+              <a:gd name="adj" fmla="val 1166"/>
+            </a:avLst>
+          </a:prstGeom>
+          <a:solidFill>
+            <a:srgbClr val="FBFAFC"/>
+          </a:solidFill>
+          <a:ln w="63500" cap="rnd">
+            <a:solidFill>
+              <a:schemeClr val="tx2">
+                <a:lumMod val="75000"/>
+                <a:alpha val="87000"/>
+              </a:schemeClr>
+            </a:solidFill>
+            <a:bevel/>
+          </a:ln>
+        </p:spPr>
+        <p:style>
+          <a:lnRef idx="2">
+            <a:schemeClr val="accent1">
+              <a:shade val="50000"/>
+            </a:schemeClr>
+          </a:lnRef>
+          <a:fillRef idx="1">
+            <a:schemeClr val="accent1"/>
+          </a:fillRef>
+          <a:effectRef idx="0">
+            <a:schemeClr val="accent1"/>
+          </a:effectRef>
+          <a:fontRef idx="minor">
+            <a:schemeClr val="lt1"/>
+          </a:fontRef>
+        </p:style>
+        <p:txBody>
+          <a:bodyPr rtlCol="0" anchor="ctr"/>
+          <a:lstStyle/>
+          <a:p>
+            <a:pPr algn="ctr"/>
+            <a:endParaRPr lang="en-US" sz="4882"/>
+          </a:p>
+        </p:txBody>
+      </p:sp>
+      <p:sp>
+        <p:nvSpPr>
+          <p:cNvPr id="5" name="TextBox 4"/>
+          <p:cNvSpPr txBox="1"/>
+          <p:nvPr/>
+        </p:nvSpPr>
+        <p:spPr>
+          <a:xfrm>
+            <a:off x="1" y="-14334"/>
+            <a:ext cx="30267274" cy="1507464"/>
+          </a:xfrm>
+          <a:prstGeom prst="rect">
+            <a:avLst/>
+          </a:prstGeom>
+          <a:noFill/>
+        </p:spPr>
+        <p:txBody>
+          <a:bodyPr wrap="square" rtlCol="0">
+            <a:spAutoFit/>
+          </a:bodyPr>
+          <a:lstStyle/>
+          <a:p>
+            <a:pPr algn="ctr"/>
+            <a:r>
+              <a:rPr lang="en-US" sz="9196" dirty="0">
+                <a:solidFill>
+                  <a:schemeClr val="tx2">
+                    <a:lumMod val="75000"/>
+                  </a:schemeClr>
+                </a:solidFill>
+              </a:rPr>
+              <a:t>Title</a:t>
+            </a:r>
+          </a:p>
+        </p:txBody>
+      </p:sp>
+      <p:sp>
+        <p:nvSpPr>
+          <p:cNvPr id="6" name="TextBox 5"/>
+          <p:cNvSpPr txBox="1"/>
+          <p:nvPr/>
+        </p:nvSpPr>
+        <p:spPr>
+          <a:xfrm>
+            <a:off x="1228791" y="1493130"/>
+            <a:ext cx="28025159" cy="1569660"/>
+          </a:xfrm>
+          <a:prstGeom prst="rect">
+            <a:avLst/>
+          </a:prstGeom>
+          <a:noFill/>
+        </p:spPr>
+        <p:txBody>
+          <a:bodyPr wrap="square" rtlCol="0">
+            <a:spAutoFit/>
+          </a:bodyPr>
+          <a:lstStyle/>
+          <a:p>
+            <a:pPr algn="ctr"/>
+            <a:r>
+              <a:rPr lang="en-US" sz="4800" dirty="0">
+                <a:solidFill>
+                  <a:schemeClr val="tx2">
+                    <a:lumMod val="75000"/>
+                  </a:schemeClr>
+                </a:solidFill>
+              </a:rPr>
+              <a:t>Cu </a:t>
+            </a:r>
+            <a:r>
+              <a:rPr lang="en-US" sz="4800" dirty="0" err="1">
+                <a:solidFill>
+                  <a:schemeClr val="tx2">
+                    <a:lumMod val="75000"/>
+                  </a:schemeClr>
+                </a:solidFill>
+              </a:rPr>
+              <a:t>indoctum</a:t>
+            </a:r>
+            <a:r>
+              <a:rPr lang="en-US" sz="4800" dirty="0">
+                <a:solidFill>
+                  <a:schemeClr val="tx2">
+                    <a:lumMod val="75000"/>
+                  </a:schemeClr>
+                </a:solidFill>
+              </a:rPr>
+              <a:t> </a:t>
+            </a:r>
+            <a:r>
+              <a:rPr lang="en-US" sz="4800" dirty="0" err="1">
+                <a:solidFill>
+                  <a:schemeClr val="tx2">
+                    <a:lumMod val="75000"/>
+                  </a:schemeClr>
+                </a:solidFill>
+              </a:rPr>
+              <a:t>accusamus</a:t>
+            </a:r>
+            <a:r>
+              <a:rPr lang="en-US" sz="4800" dirty="0">
+                <a:solidFill>
+                  <a:schemeClr val="tx2">
+                    <a:lumMod val="75000"/>
+                  </a:schemeClr>
+                </a:solidFill>
+              </a:rPr>
+              <a:t> </a:t>
+            </a:r>
+            <a:r>
+              <a:rPr lang="en-US" sz="4800" dirty="0" err="1">
+                <a:solidFill>
+                  <a:schemeClr val="tx2">
+                    <a:lumMod val="75000"/>
+                  </a:schemeClr>
+                </a:solidFill>
+              </a:rPr>
+              <a:t>expetendis</a:t>
+            </a:r>
+            <a:r>
+              <a:rPr lang="en-US" sz="4800" dirty="0">
+                <a:solidFill>
+                  <a:schemeClr val="tx2">
+                    <a:lumMod val="75000"/>
+                  </a:schemeClr>
+                </a:solidFill>
+              </a:rPr>
+              <a:t> </a:t>
+            </a:r>
+            <a:r>
+              <a:rPr lang="en-US" sz="4800" dirty="0" err="1">
+                <a:solidFill>
+                  <a:schemeClr val="tx2">
+                    <a:lumMod val="75000"/>
+                  </a:schemeClr>
+                </a:solidFill>
+              </a:rPr>
+              <a:t>ius</a:t>
+            </a:r>
+            <a:r>
+              <a:rPr lang="en-US" sz="4800" dirty="0">
+                <a:solidFill>
+                  <a:schemeClr val="tx2">
+                    <a:lumMod val="75000"/>
+                  </a:schemeClr>
+                </a:solidFill>
+              </a:rPr>
+              <a:t>, his </a:t>
+            </a:r>
+            <a:r>
+              <a:rPr lang="en-US" sz="4800" dirty="0" err="1">
+                <a:solidFill>
+                  <a:schemeClr val="tx2">
+                    <a:lumMod val="75000"/>
+                  </a:schemeClr>
+                </a:solidFill>
+              </a:rPr>
+              <a:t>fabellas</a:t>
+            </a:r>
+            <a:r>
+              <a:rPr lang="en-US" sz="4800" dirty="0">
+                <a:solidFill>
+                  <a:schemeClr val="tx2">
+                    <a:lumMod val="75000"/>
+                  </a:schemeClr>
+                </a:solidFill>
+              </a:rPr>
+              <a:t> </a:t>
+            </a:r>
+            <a:r>
+              <a:rPr lang="en-US" sz="4800" dirty="0" err="1">
+                <a:solidFill>
+                  <a:schemeClr val="tx2">
+                    <a:lumMod val="75000"/>
+                  </a:schemeClr>
+                </a:solidFill>
+              </a:rPr>
+              <a:t>honestatis</a:t>
+            </a:r>
+            <a:r>
+              <a:rPr lang="en-US" sz="4800" dirty="0">
+                <a:solidFill>
+                  <a:schemeClr val="tx2">
+                    <a:lumMod val="75000"/>
+                  </a:schemeClr>
+                </a:solidFill>
+              </a:rPr>
+              <a:t> at. No </a:t>
+            </a:r>
+            <a:r>
+              <a:rPr lang="en-US" sz="4800" dirty="0" err="1">
+                <a:solidFill>
+                  <a:schemeClr val="tx2">
+                    <a:lumMod val="75000"/>
+                  </a:schemeClr>
+                </a:solidFill>
+              </a:rPr>
+              <a:t>dicit</a:t>
+            </a:r>
+            <a:r>
+              <a:rPr lang="en-US" sz="4800" dirty="0">
+                <a:solidFill>
+                  <a:schemeClr val="tx2">
+                    <a:lumMod val="75000"/>
+                  </a:schemeClr>
+                </a:solidFill>
+              </a:rPr>
+              <a:t> </a:t>
+            </a:r>
+            <a:r>
+              <a:rPr lang="en-US" sz="4800" dirty="0" err="1">
+                <a:solidFill>
+                  <a:schemeClr val="tx2">
+                    <a:lumMod val="75000"/>
+                  </a:schemeClr>
+                </a:solidFill>
+              </a:rPr>
+              <a:t>saepe</a:t>
+            </a:r>
+            <a:r>
+              <a:rPr lang="en-US" sz="4800" dirty="0">
+                <a:solidFill>
+                  <a:schemeClr val="tx2">
+                    <a:lumMod val="75000"/>
+                  </a:schemeClr>
+                </a:solidFill>
+              </a:rPr>
+              <a:t> </a:t>
+            </a:r>
+            <a:r>
+              <a:rPr lang="en-US" sz="4800" dirty="0" err="1">
+                <a:solidFill>
+                  <a:schemeClr val="tx2">
+                    <a:lumMod val="75000"/>
+                  </a:schemeClr>
+                </a:solidFill>
+              </a:rPr>
+              <a:t>melius</a:t>
+            </a:r>
+            <a:r>
+              <a:rPr lang="en-US" sz="4800" dirty="0">
+                <a:solidFill>
+                  <a:schemeClr val="tx2">
+                    <a:lumMod val="75000"/>
+                  </a:schemeClr>
+                </a:solidFill>
+              </a:rPr>
+              <a:t> per. Qui </a:t>
+            </a:r>
+            <a:r>
+              <a:rPr lang="en-US" sz="4800" dirty="0" err="1">
+                <a:solidFill>
+                  <a:schemeClr val="tx2">
+                    <a:lumMod val="75000"/>
+                  </a:schemeClr>
+                </a:solidFill>
+              </a:rPr>
+              <a:t>vidisse</a:t>
+            </a:r>
+            <a:r>
+              <a:rPr lang="en-US" sz="4800" dirty="0">
+                <a:solidFill>
+                  <a:schemeClr val="tx2">
+                    <a:lumMod val="75000"/>
+                  </a:schemeClr>
+                </a:solidFill>
+              </a:rPr>
+              <a:t> </a:t>
+            </a:r>
+            <a:r>
+              <a:rPr lang="en-US" sz="4800" dirty="0" err="1">
+                <a:solidFill>
+                  <a:schemeClr val="tx2">
+                    <a:lumMod val="75000"/>
+                  </a:schemeClr>
+                </a:solidFill>
+              </a:rPr>
+              <a:t>admodum</a:t>
+            </a:r>
+            <a:r>
+              <a:rPr lang="en-US" sz="4800" dirty="0">
+                <a:solidFill>
+                  <a:schemeClr val="tx2">
+                    <a:lumMod val="75000"/>
+                  </a:schemeClr>
+                </a:solidFill>
+              </a:rPr>
+              <a:t> </a:t>
+            </a:r>
+            <a:r>
+              <a:rPr lang="en-US" sz="4800" dirty="0" err="1">
+                <a:solidFill>
+                  <a:schemeClr val="tx2">
+                    <a:lumMod val="75000"/>
+                  </a:schemeClr>
+                </a:solidFill>
+              </a:rPr>
+              <a:t>consequat</a:t>
+            </a:r>
+            <a:r>
+              <a:rPr lang="en-US" sz="4800" dirty="0">
+                <a:solidFill>
+                  <a:schemeClr val="tx2">
+                    <a:lumMod val="75000"/>
+                  </a:schemeClr>
+                </a:solidFill>
+              </a:rPr>
+              <a:t> ad.</a:t>
+            </a:r>
+          </a:p>
+        </p:txBody>
+      </p:sp>
+      <p:sp>
+        <p:nvSpPr>
+          <p:cNvPr id="8" name="Rectangle 7"/>
+          <p:cNvSpPr/>
+          <p:nvPr/>
+        </p:nvSpPr>
+        <p:spPr>
+          <a:xfrm>
+            <a:off x="503237" y="4175919"/>
+            <a:ext cx="9108140" cy="830997"/>
+          </a:xfrm>
+          <a:prstGeom prst="rect">
+            <a:avLst/>
+          </a:prstGeom>
+        </p:spPr>
+        <p:txBody>
+          <a:bodyPr wrap="square">
+            <a:spAutoFit/>
+          </a:bodyPr>
+          <a:lstStyle/>
+          <a:p>
+            <a:r>
+              <a:rPr lang="en-US" sz="4800" dirty="0">
+                <a:solidFill>
+                  <a:schemeClr val="tx2">
+                    <a:lumMod val="75000"/>
+                  </a:schemeClr>
+                </a:solidFill>
+              </a:rPr>
+              <a:t>Background</a:t>
+            </a:r>
+            <a:endParaRPr lang="en-US" sz="4800" dirty="0">
+              <a:solidFill>
+                <a:schemeClr val="tx2">
+                  <a:lumMod val="75000"/>
+                </a:schemeClr>
+              </a:solidFill>
+            </a:endParaRPr>
+          </a:p>
+        </p:txBody>
+      </p:sp>
+      <p:sp>
+        <p:nvSpPr>
+          <p:cNvPr id="42" name="Action Button: Movie 41">
+            <a:hlinkClick r:id="" action="ppaction://noaction" highlightClick="1"/>
+          </p:cNvPr>
+          <p:cNvSpPr/>
+          <p:nvPr/>
+        </p:nvSpPr>
+        <p:spPr>
+          <a:xfrm>
+            <a:off x="-8995939" y="5171395"/>
+            <a:ext cx="592838" cy="592838"/>
+          </a:xfrm>
+          <a:prstGeom prst="actionButtonMovie">
+            <a:avLst/>
+          </a:prstGeom>
+        </p:spPr>
+        <p:style>
+          <a:lnRef idx="2">
+            <a:schemeClr val="accent1">
+              <a:shade val="50000"/>
+            </a:schemeClr>
+          </a:lnRef>
+          <a:fillRef idx="1">
+            <a:schemeClr val="accent1"/>
+          </a:fillRef>
+          <a:effectRef idx="0">
+            <a:schemeClr val="accent1"/>
+          </a:effectRef>
+          <a:fontRef idx="minor">
+            <a:schemeClr val="lt1"/>
+          </a:fontRef>
+        </p:style>
+        <p:txBody>
+          <a:bodyPr rtlCol="0" anchor="ctr"/>
+          <a:lstStyle/>
+          <a:p>
+            <a:pPr algn="ctr"/>
+            <a:endParaRPr lang="en-US" sz="4882"/>
+          </a:p>
+        </p:txBody>
+      </p:sp>
+      <p:sp>
+        <p:nvSpPr>
+          <p:cNvPr id="43" name="TextBox 42"/>
+          <p:cNvSpPr txBox="1"/>
+          <p:nvPr/>
+        </p:nvSpPr>
+        <p:spPr>
+          <a:xfrm>
+            <a:off x="-8305978" y="5189963"/>
+            <a:ext cx="8040920" cy="571247"/>
+          </a:xfrm>
+          <a:prstGeom prst="rect">
+            <a:avLst/>
+          </a:prstGeom>
+          <a:noFill/>
+        </p:spPr>
+        <p:txBody>
+          <a:bodyPr wrap="square" rtlCol="0">
+            <a:spAutoFit/>
+          </a:bodyPr>
+          <a:lstStyle/>
+          <a:p>
+            <a:r>
+              <a:rPr lang="en-US" sz="3112" dirty="0"/>
+              <a:t>Photo of instruments on King Air</a:t>
+            </a:r>
+            <a:endParaRPr lang="en-US" sz="3112" dirty="0"/>
+          </a:p>
+        </p:txBody>
+      </p:sp>
+      <p:sp>
+        <p:nvSpPr>
+          <p:cNvPr id="45" name="Rounded Rectangle 44"/>
+          <p:cNvSpPr/>
+          <p:nvPr/>
+        </p:nvSpPr>
+        <p:spPr>
+          <a:xfrm>
+            <a:off x="350837" y="26917660"/>
+            <a:ext cx="14478000" cy="8203377"/>
+          </a:xfrm>
+          <a:prstGeom prst="roundRect">
+            <a:avLst>
+              <a:gd name="adj" fmla="val 1166"/>
+            </a:avLst>
+          </a:prstGeom>
+          <a:solidFill>
+            <a:srgbClr val="FBFAFC"/>
+          </a:solidFill>
+          <a:ln w="63500" cap="rnd">
+            <a:solidFill>
+              <a:schemeClr val="tx2">
+                <a:lumMod val="75000"/>
+                <a:alpha val="87000"/>
+              </a:schemeClr>
+            </a:solidFill>
+            <a:bevel/>
+          </a:ln>
+        </p:spPr>
+        <p:style>
+          <a:lnRef idx="2">
+            <a:schemeClr val="accent1">
+              <a:shade val="50000"/>
+            </a:schemeClr>
+          </a:lnRef>
+          <a:fillRef idx="1">
+            <a:schemeClr val="accent1"/>
+          </a:fillRef>
+          <a:effectRef idx="0">
+            <a:schemeClr val="accent1"/>
+          </a:effectRef>
+          <a:fontRef idx="minor">
+            <a:schemeClr val="lt1"/>
+          </a:fontRef>
+        </p:style>
+        <p:txBody>
+          <a:bodyPr rtlCol="0" anchor="ctr"/>
+          <a:lstStyle/>
+          <a:p>
+            <a:pPr algn="ctr"/>
+            <a:endParaRPr lang="en-US" sz="4882"/>
+          </a:p>
+        </p:txBody>
+      </p:sp>
+      <p:sp>
+        <p:nvSpPr>
+          <p:cNvPr id="14" name="Rectangle 13"/>
+          <p:cNvSpPr/>
+          <p:nvPr/>
+        </p:nvSpPr>
+        <p:spPr>
+          <a:xfrm>
+            <a:off x="717430" y="27128659"/>
+            <a:ext cx="9108140" cy="830997"/>
+          </a:xfrm>
+          <a:prstGeom prst="rect">
+            <a:avLst/>
+          </a:prstGeom>
+        </p:spPr>
+        <p:txBody>
+          <a:bodyPr wrap="square">
+            <a:spAutoFit/>
+          </a:bodyPr>
+          <a:lstStyle/>
+          <a:p>
+            <a:r>
+              <a:rPr lang="en-US" sz="4800" dirty="0">
+                <a:solidFill>
+                  <a:schemeClr val="tx2">
+                    <a:lumMod val="75000"/>
+                  </a:schemeClr>
+                </a:solidFill>
+              </a:rPr>
+              <a:t>Objectives</a:t>
+            </a:r>
+            <a:endParaRPr lang="en-US" sz="4800" dirty="0">
+              <a:solidFill>
+                <a:schemeClr val="tx2">
+                  <a:lumMod val="75000"/>
+                </a:schemeClr>
+              </a:solidFill>
+            </a:endParaRPr>
+          </a:p>
+        </p:txBody>
+      </p:sp>
+      <p:sp>
+        <p:nvSpPr>
+          <p:cNvPr id="46" name="Rounded Rectangle 45"/>
+          <p:cNvSpPr/>
+          <p:nvPr/>
+        </p:nvSpPr>
+        <p:spPr>
+          <a:xfrm>
+            <a:off x="350837" y="39685119"/>
+            <a:ext cx="14478000" cy="2743200"/>
+          </a:xfrm>
+          <a:prstGeom prst="roundRect">
+            <a:avLst>
+              <a:gd name="adj" fmla="val 1166"/>
+            </a:avLst>
+          </a:prstGeom>
+          <a:solidFill>
+            <a:srgbClr val="FBFAFC"/>
+          </a:solidFill>
+          <a:ln w="63500" cap="rnd">
+            <a:solidFill>
+              <a:schemeClr val="tx2">
+                <a:lumMod val="75000"/>
+                <a:alpha val="87000"/>
+              </a:schemeClr>
+            </a:solidFill>
+            <a:bevel/>
+          </a:ln>
+        </p:spPr>
+        <p:style>
+          <a:lnRef idx="2">
+            <a:schemeClr val="accent1">
+              <a:shade val="50000"/>
+            </a:schemeClr>
+          </a:lnRef>
+          <a:fillRef idx="1">
+            <a:schemeClr val="accent1"/>
+          </a:fillRef>
+          <a:effectRef idx="0">
+            <a:schemeClr val="accent1"/>
+          </a:effectRef>
+          <a:fontRef idx="minor">
+            <a:schemeClr val="lt1"/>
+          </a:fontRef>
+        </p:style>
+        <p:txBody>
+          <a:bodyPr rtlCol="0" anchor="ctr"/>
+          <a:lstStyle/>
+          <a:p>
+            <a:pPr algn="ctr"/>
+            <a:endParaRPr lang="en-US" sz="4882"/>
+          </a:p>
+        </p:txBody>
+      </p:sp>
+      <p:sp>
+        <p:nvSpPr>
+          <p:cNvPr id="47" name="Rounded Rectangle 46"/>
+          <p:cNvSpPr/>
+          <p:nvPr/>
+        </p:nvSpPr>
+        <p:spPr>
+          <a:xfrm>
+            <a:off x="15514637" y="39685119"/>
+            <a:ext cx="14478000" cy="2743200"/>
+          </a:xfrm>
+          <a:prstGeom prst="roundRect">
+            <a:avLst>
+              <a:gd name="adj" fmla="val 1166"/>
+            </a:avLst>
+          </a:prstGeom>
+          <a:solidFill>
+            <a:srgbClr val="FBFAFC"/>
+          </a:solidFill>
+          <a:ln w="63500" cap="rnd">
+            <a:solidFill>
+              <a:schemeClr val="tx2">
+                <a:lumMod val="75000"/>
+                <a:alpha val="87000"/>
+              </a:schemeClr>
+            </a:solidFill>
+            <a:bevel/>
+          </a:ln>
+        </p:spPr>
+        <p:style>
+          <a:lnRef idx="2">
+            <a:schemeClr val="accent1">
+              <a:shade val="50000"/>
+            </a:schemeClr>
+          </a:lnRef>
+          <a:fillRef idx="1">
+            <a:schemeClr val="accent1"/>
+          </a:fillRef>
+          <a:effectRef idx="0">
+            <a:schemeClr val="accent1"/>
+          </a:effectRef>
+          <a:fontRef idx="minor">
+            <a:schemeClr val="lt1"/>
+          </a:fontRef>
+        </p:style>
+        <p:txBody>
+          <a:bodyPr rtlCol="0" anchor="ctr"/>
+          <a:lstStyle/>
+          <a:p>
+            <a:pPr algn="ctr"/>
+            <a:endParaRPr lang="en-US" sz="4882"/>
+          </a:p>
+        </p:txBody>
+      </p:sp>
+      <p:sp>
+        <p:nvSpPr>
+          <p:cNvPr id="18" name="Rectangle 17"/>
+          <p:cNvSpPr/>
+          <p:nvPr/>
+        </p:nvSpPr>
+        <p:spPr>
+          <a:xfrm>
+            <a:off x="15702897" y="39854059"/>
+            <a:ext cx="9108140" cy="745460"/>
+          </a:xfrm>
+          <a:prstGeom prst="rect">
+            <a:avLst/>
+          </a:prstGeom>
+        </p:spPr>
+        <p:txBody>
+          <a:bodyPr wrap="square">
+            <a:spAutoFit/>
+          </a:bodyPr>
+          <a:lstStyle/>
+          <a:p>
+            <a:r>
+              <a:rPr lang="en-US" sz="4244" dirty="0">
+                <a:solidFill>
+                  <a:schemeClr val="tx2">
+                    <a:lumMod val="75000"/>
+                  </a:schemeClr>
+                </a:solidFill>
+              </a:rPr>
+              <a:t>Acknowledgements</a:t>
+            </a:r>
+            <a:endParaRPr lang="en-US" sz="4244" dirty="0">
+              <a:solidFill>
+                <a:schemeClr val="tx2">
+                  <a:lumMod val="75000"/>
+                </a:schemeClr>
+              </a:solidFill>
+            </a:endParaRPr>
+          </a:p>
+        </p:txBody>
+      </p:sp>
+      <p:sp>
+        <p:nvSpPr>
+          <p:cNvPr id="22" name="Rectangle 21"/>
+          <p:cNvSpPr/>
+          <p:nvPr/>
+        </p:nvSpPr>
+        <p:spPr>
+          <a:xfrm>
+            <a:off x="717430" y="39777859"/>
+            <a:ext cx="9108140" cy="745460"/>
+          </a:xfrm>
+          <a:prstGeom prst="rect">
+            <a:avLst/>
+          </a:prstGeom>
+        </p:spPr>
+        <p:txBody>
+          <a:bodyPr wrap="square">
+            <a:spAutoFit/>
+          </a:bodyPr>
+          <a:lstStyle/>
+          <a:p>
+            <a:r>
+              <a:rPr lang="en-US" sz="4244" dirty="0">
+                <a:solidFill>
+                  <a:schemeClr val="tx2">
+                    <a:lumMod val="75000"/>
+                  </a:schemeClr>
+                </a:solidFill>
+              </a:rPr>
+              <a:t>References</a:t>
+            </a:r>
+            <a:endParaRPr lang="en-US" sz="4244" dirty="0">
+              <a:solidFill>
+                <a:schemeClr val="tx2">
+                  <a:lumMod val="75000"/>
+                </a:schemeClr>
+              </a:solidFill>
+            </a:endParaRPr>
+          </a:p>
+        </p:txBody>
+      </p:sp>
+      <p:sp>
+        <p:nvSpPr>
+          <p:cNvPr id="48" name="Rounded Rectangle 47"/>
+          <p:cNvSpPr/>
+          <p:nvPr/>
+        </p:nvSpPr>
+        <p:spPr>
+          <a:xfrm>
+            <a:off x="342445" y="35612378"/>
+            <a:ext cx="14478000" cy="3581400"/>
+          </a:xfrm>
+          <a:prstGeom prst="roundRect">
+            <a:avLst>
+              <a:gd name="adj" fmla="val 1166"/>
+            </a:avLst>
+          </a:prstGeom>
+          <a:solidFill>
+            <a:srgbClr val="FBFAFC"/>
+          </a:solidFill>
+          <a:ln w="63500" cap="rnd">
+            <a:solidFill>
+              <a:schemeClr val="tx2">
+                <a:lumMod val="75000"/>
+                <a:alpha val="87000"/>
+              </a:schemeClr>
+            </a:solidFill>
+            <a:bevel/>
+          </a:ln>
+        </p:spPr>
+        <p:style>
+          <a:lnRef idx="2">
+            <a:schemeClr val="accent1">
+              <a:shade val="50000"/>
+            </a:schemeClr>
+          </a:lnRef>
+          <a:fillRef idx="1">
+            <a:schemeClr val="accent1"/>
+          </a:fillRef>
+          <a:effectRef idx="0">
+            <a:schemeClr val="accent1"/>
+          </a:effectRef>
+          <a:fontRef idx="minor">
+            <a:schemeClr val="lt1"/>
+          </a:fontRef>
+        </p:style>
+        <p:txBody>
+          <a:bodyPr rtlCol="0" anchor="ctr"/>
+          <a:lstStyle/>
+          <a:p>
+            <a:pPr algn="ctr"/>
+            <a:endParaRPr lang="en-US" sz="4882"/>
+          </a:p>
+        </p:txBody>
+      </p:sp>
+      <p:sp>
+        <p:nvSpPr>
+          <p:cNvPr id="49" name="Rectangle 48"/>
+          <p:cNvSpPr/>
+          <p:nvPr/>
+        </p:nvSpPr>
+        <p:spPr>
+          <a:xfrm>
+            <a:off x="709038" y="35823376"/>
+            <a:ext cx="9108140" cy="745460"/>
+          </a:xfrm>
+          <a:prstGeom prst="rect">
+            <a:avLst/>
+          </a:prstGeom>
+        </p:spPr>
+        <p:txBody>
+          <a:bodyPr wrap="square">
+            <a:spAutoFit/>
+          </a:bodyPr>
+          <a:lstStyle/>
+          <a:p>
+            <a:r>
+              <a:rPr lang="en-US" sz="4244" dirty="0" smtClean="0">
+                <a:solidFill>
+                  <a:schemeClr val="tx2">
+                    <a:lumMod val="75000"/>
+                  </a:schemeClr>
+                </a:solidFill>
+              </a:rPr>
+              <a:t>Remaining Work</a:t>
+            </a:r>
+            <a:endParaRPr lang="en-US" sz="4244" dirty="0">
+              <a:solidFill>
+                <a:schemeClr val="tx2">
+                  <a:lumMod val="75000"/>
+                </a:schemeClr>
+              </a:solidFill>
+            </a:endParaRPr>
+          </a:p>
+        </p:txBody>
+      </p:sp>
+      <p:sp>
+        <p:nvSpPr>
+          <p:cNvPr id="50" name="Rounded Rectangle 49"/>
+          <p:cNvSpPr/>
+          <p:nvPr/>
+        </p:nvSpPr>
+        <p:spPr>
+          <a:xfrm>
+            <a:off x="15514637" y="4042034"/>
+            <a:ext cx="14478000" cy="17431285"/>
+          </a:xfrm>
+          <a:prstGeom prst="roundRect">
+            <a:avLst>
+              <a:gd name="adj" fmla="val 1166"/>
+            </a:avLst>
+          </a:prstGeom>
+          <a:solidFill>
+            <a:srgbClr val="FBFAFC"/>
+          </a:solidFill>
+          <a:ln w="63500" cap="rnd">
+            <a:solidFill>
+              <a:schemeClr val="tx2">
+                <a:lumMod val="75000"/>
+                <a:alpha val="87000"/>
+              </a:schemeClr>
+            </a:solidFill>
+            <a:bevel/>
+          </a:ln>
+        </p:spPr>
+        <p:style>
+          <a:lnRef idx="2">
+            <a:schemeClr val="accent1">
+              <a:shade val="50000"/>
+            </a:schemeClr>
+          </a:lnRef>
+          <a:fillRef idx="1">
+            <a:schemeClr val="accent1"/>
+          </a:fillRef>
+          <a:effectRef idx="0">
+            <a:schemeClr val="accent1"/>
+          </a:effectRef>
+          <a:fontRef idx="minor">
+            <a:schemeClr val="lt1"/>
+          </a:fontRef>
+        </p:style>
+        <p:txBody>
+          <a:bodyPr rtlCol="0" anchor="ctr"/>
+          <a:lstStyle/>
+          <a:p>
+            <a:pPr algn="ctr"/>
+            <a:endParaRPr lang="en-US" sz="4882"/>
+          </a:p>
+        </p:txBody>
+      </p:sp>
+      <p:sp>
+        <p:nvSpPr>
+          <p:cNvPr id="10" name="Rectangle 9"/>
+          <p:cNvSpPr/>
+          <p:nvPr/>
+        </p:nvSpPr>
+        <p:spPr>
+          <a:xfrm>
+            <a:off x="15702897" y="4197524"/>
+            <a:ext cx="9108140" cy="830997"/>
+          </a:xfrm>
+          <a:prstGeom prst="rect">
+            <a:avLst/>
+          </a:prstGeom>
+        </p:spPr>
+        <p:txBody>
+          <a:bodyPr wrap="square">
+            <a:spAutoFit/>
+          </a:bodyPr>
+          <a:lstStyle/>
+          <a:p>
+            <a:r>
+              <a:rPr lang="en-US" sz="4800" dirty="0" smtClean="0">
+                <a:solidFill>
+                  <a:schemeClr val="tx2">
+                    <a:lumMod val="75000"/>
+                  </a:schemeClr>
+                </a:solidFill>
+              </a:rPr>
+              <a:t>Generator Assembly</a:t>
+            </a:r>
+            <a:endParaRPr lang="en-US" sz="4800" dirty="0">
+              <a:solidFill>
+                <a:schemeClr val="tx2">
+                  <a:lumMod val="75000"/>
+                </a:schemeClr>
+              </a:solidFill>
+            </a:endParaRPr>
+          </a:p>
+        </p:txBody>
+      </p:sp>
+      <p:sp>
+        <p:nvSpPr>
+          <p:cNvPr id="26" name="Action Button: Movie 25">
+            <a:hlinkClick r:id="" action="ppaction://noaction" highlightClick="1"/>
+          </p:cNvPr>
+          <p:cNvSpPr/>
+          <p:nvPr/>
+        </p:nvSpPr>
+        <p:spPr>
+          <a:xfrm>
+            <a:off x="31330252" y="5761369"/>
+            <a:ext cx="592838" cy="592838"/>
+          </a:xfrm>
+          <a:prstGeom prst="actionButtonMovie">
+            <a:avLst/>
+          </a:prstGeom>
+        </p:spPr>
+        <p:style>
+          <a:lnRef idx="2">
+            <a:schemeClr val="accent1">
+              <a:shade val="50000"/>
+            </a:schemeClr>
+          </a:lnRef>
+          <a:fillRef idx="1">
+            <a:schemeClr val="accent1"/>
+          </a:fillRef>
+          <a:effectRef idx="0">
+            <a:schemeClr val="accent1"/>
+          </a:effectRef>
+          <a:fontRef idx="minor">
+            <a:schemeClr val="lt1"/>
+          </a:fontRef>
+        </p:style>
+        <p:txBody>
+          <a:bodyPr rtlCol="0" anchor="ctr"/>
+          <a:lstStyle/>
+          <a:p>
+            <a:pPr algn="ctr"/>
+            <a:endParaRPr lang="en-US" sz="4882"/>
+          </a:p>
+        </p:txBody>
+      </p:sp>
+      <p:sp>
+        <p:nvSpPr>
+          <p:cNvPr id="29" name="TextBox 28"/>
+          <p:cNvSpPr txBox="1"/>
+          <p:nvPr/>
+        </p:nvSpPr>
+        <p:spPr>
+          <a:xfrm>
+            <a:off x="32095440" y="5810000"/>
+            <a:ext cx="8040920" cy="571247"/>
+          </a:xfrm>
+          <a:prstGeom prst="rect">
+            <a:avLst/>
+          </a:prstGeom>
+          <a:noFill/>
+        </p:spPr>
+        <p:txBody>
+          <a:bodyPr wrap="square" rtlCol="0">
+            <a:spAutoFit/>
+          </a:bodyPr>
+          <a:lstStyle/>
+          <a:p>
+            <a:r>
+              <a:rPr lang="en-US" sz="3112" dirty="0"/>
+              <a:t>Generator cutaway CAD diagram </a:t>
+            </a:r>
+            <a:endParaRPr lang="en-US" sz="3112" dirty="0"/>
+          </a:p>
+        </p:txBody>
+      </p:sp>
+      <p:sp>
+        <p:nvSpPr>
+          <p:cNvPr id="51" name="Rounded Rectangle 50"/>
+          <p:cNvSpPr/>
+          <p:nvPr/>
+        </p:nvSpPr>
+        <p:spPr>
+          <a:xfrm>
+            <a:off x="15514637" y="21762330"/>
+            <a:ext cx="14478000" cy="17431448"/>
+          </a:xfrm>
+          <a:prstGeom prst="roundRect">
+            <a:avLst>
+              <a:gd name="adj" fmla="val 1166"/>
+            </a:avLst>
+          </a:prstGeom>
+          <a:solidFill>
+            <a:srgbClr val="FBFAFC"/>
+          </a:solidFill>
+          <a:ln w="63500" cap="rnd">
+            <a:solidFill>
+              <a:schemeClr val="tx2">
+                <a:lumMod val="75000"/>
+                <a:alpha val="87000"/>
+              </a:schemeClr>
+            </a:solidFill>
+            <a:bevel/>
+          </a:ln>
+        </p:spPr>
+        <p:style>
+          <a:lnRef idx="2">
+            <a:schemeClr val="accent1">
+              <a:shade val="50000"/>
+            </a:schemeClr>
+          </a:lnRef>
+          <a:fillRef idx="1">
+            <a:schemeClr val="accent1"/>
+          </a:fillRef>
+          <a:effectRef idx="0">
+            <a:schemeClr val="accent1"/>
+          </a:effectRef>
+          <a:fontRef idx="minor">
+            <a:schemeClr val="lt1"/>
+          </a:fontRef>
+        </p:style>
+        <p:txBody>
+          <a:bodyPr rtlCol="0" anchor="ctr"/>
+          <a:lstStyle/>
+          <a:p>
+            <a:pPr algn="ctr"/>
+            <a:endParaRPr lang="en-US" sz="4882"/>
+          </a:p>
+        </p:txBody>
+      </p:sp>
+      <p:sp>
+        <p:nvSpPr>
+          <p:cNvPr id="16" name="Rectangle 15"/>
+          <p:cNvSpPr/>
+          <p:nvPr/>
+        </p:nvSpPr>
+        <p:spPr>
+          <a:xfrm>
+            <a:off x="15759758" y="21964660"/>
+            <a:ext cx="9108140" cy="830997"/>
+          </a:xfrm>
+          <a:prstGeom prst="rect">
+            <a:avLst/>
+          </a:prstGeom>
+        </p:spPr>
+        <p:txBody>
+          <a:bodyPr wrap="square">
+            <a:spAutoFit/>
+          </a:bodyPr>
+          <a:lstStyle/>
+          <a:p>
+            <a:r>
+              <a:rPr lang="en-US" sz="4800" dirty="0" smtClean="0">
+                <a:solidFill>
+                  <a:schemeClr val="tx2">
+                    <a:lumMod val="75000"/>
+                  </a:schemeClr>
+                </a:solidFill>
+              </a:rPr>
+              <a:t>System Design</a:t>
+            </a:r>
+            <a:endParaRPr lang="en-US" sz="4800" dirty="0">
+              <a:solidFill>
+                <a:schemeClr val="tx2">
+                  <a:lumMod val="75000"/>
+                </a:schemeClr>
+              </a:solidFill>
+            </a:endParaRPr>
+          </a:p>
+        </p:txBody>
+      </p:sp>
+      <p:sp>
+        <p:nvSpPr>
+          <p:cNvPr id="30" name="Action Button: Movie 29">
+            <a:hlinkClick r:id="" action="ppaction://noaction" highlightClick="1"/>
+          </p:cNvPr>
+          <p:cNvSpPr/>
+          <p:nvPr/>
+        </p:nvSpPr>
+        <p:spPr>
+          <a:xfrm>
+            <a:off x="31361049" y="23346098"/>
+            <a:ext cx="592838" cy="592838"/>
+          </a:xfrm>
+          <a:prstGeom prst="actionButtonMovie">
+            <a:avLst/>
+          </a:prstGeom>
+        </p:spPr>
+        <p:style>
+          <a:lnRef idx="2">
+            <a:schemeClr val="accent1">
+              <a:shade val="50000"/>
+            </a:schemeClr>
+          </a:lnRef>
+          <a:fillRef idx="1">
+            <a:schemeClr val="accent1"/>
+          </a:fillRef>
+          <a:effectRef idx="0">
+            <a:schemeClr val="accent1"/>
+          </a:effectRef>
+          <a:fontRef idx="minor">
+            <a:schemeClr val="lt1"/>
+          </a:fontRef>
+        </p:style>
+        <p:txBody>
+          <a:bodyPr rtlCol="0" anchor="ctr"/>
+          <a:lstStyle/>
+          <a:p>
+            <a:pPr algn="ctr"/>
+            <a:endParaRPr lang="en-US" sz="4882"/>
+          </a:p>
+        </p:txBody>
+      </p:sp>
+      <p:sp>
+        <p:nvSpPr>
+          <p:cNvPr id="31" name="TextBox 30"/>
+          <p:cNvSpPr txBox="1"/>
+          <p:nvPr/>
+        </p:nvSpPr>
+        <p:spPr>
+          <a:xfrm>
+            <a:off x="32126237" y="23394730"/>
+            <a:ext cx="8040920" cy="571247"/>
+          </a:xfrm>
+          <a:prstGeom prst="rect">
+            <a:avLst/>
+          </a:prstGeom>
+          <a:noFill/>
+        </p:spPr>
+        <p:txBody>
+          <a:bodyPr wrap="square" rtlCol="0">
+            <a:spAutoFit/>
+          </a:bodyPr>
+          <a:lstStyle/>
+          <a:p>
+            <a:r>
+              <a:rPr lang="en-US" sz="3112" dirty="0"/>
+              <a:t>Major system component flowchart</a:t>
+            </a:r>
+            <a:endParaRPr lang="en-US" sz="3112" dirty="0"/>
+          </a:p>
+        </p:txBody>
+      </p:sp>
+      <p:sp>
+        <p:nvSpPr>
+          <p:cNvPr id="32" name="Action Button: Movie 31">
+            <a:hlinkClick r:id="" action="ppaction://noaction" highlightClick="1"/>
+          </p:cNvPr>
+          <p:cNvSpPr/>
+          <p:nvPr/>
+        </p:nvSpPr>
+        <p:spPr>
+          <a:xfrm>
+            <a:off x="31361049" y="24370182"/>
+            <a:ext cx="592838" cy="592838"/>
+          </a:xfrm>
+          <a:prstGeom prst="actionButtonMovie">
+            <a:avLst/>
+          </a:prstGeom>
+        </p:spPr>
+        <p:style>
+          <a:lnRef idx="2">
+            <a:schemeClr val="accent1">
+              <a:shade val="50000"/>
+            </a:schemeClr>
+          </a:lnRef>
+          <a:fillRef idx="1">
+            <a:schemeClr val="accent1"/>
+          </a:fillRef>
+          <a:effectRef idx="0">
+            <a:schemeClr val="accent1"/>
+          </a:effectRef>
+          <a:fontRef idx="minor">
+            <a:schemeClr val="lt1"/>
+          </a:fontRef>
+        </p:style>
+        <p:txBody>
+          <a:bodyPr rtlCol="0" anchor="ctr"/>
+          <a:lstStyle/>
+          <a:p>
+            <a:pPr algn="ctr"/>
+            <a:endParaRPr lang="en-US" sz="4882"/>
+          </a:p>
+        </p:txBody>
+      </p:sp>
+      <p:sp>
+        <p:nvSpPr>
+          <p:cNvPr id="33" name="TextBox 32"/>
+          <p:cNvSpPr txBox="1"/>
+          <p:nvPr/>
+        </p:nvSpPr>
+        <p:spPr>
+          <a:xfrm>
+            <a:off x="32126237" y="24418814"/>
+            <a:ext cx="8040920" cy="571247"/>
+          </a:xfrm>
+          <a:prstGeom prst="rect">
+            <a:avLst/>
+          </a:prstGeom>
+          <a:noFill/>
+        </p:spPr>
+        <p:txBody>
+          <a:bodyPr wrap="square" rtlCol="0">
+            <a:spAutoFit/>
+          </a:bodyPr>
+          <a:lstStyle/>
+          <a:p>
+            <a:r>
+              <a:rPr lang="en-US" sz="3112" dirty="0"/>
+              <a:t>Met Cam drop images</a:t>
+            </a:r>
+            <a:endParaRPr lang="en-US" sz="3112" dirty="0"/>
+          </a:p>
+        </p:txBody>
+      </p:sp>
+      <p:sp>
+        <p:nvSpPr>
+          <p:cNvPr id="34" name="Action Button: Movie 33">
+            <a:hlinkClick r:id="" action="ppaction://noaction" highlightClick="1"/>
+          </p:cNvPr>
+          <p:cNvSpPr/>
+          <p:nvPr/>
+        </p:nvSpPr>
+        <p:spPr>
+          <a:xfrm>
+            <a:off x="31361049" y="25364069"/>
+            <a:ext cx="592838" cy="592838"/>
+          </a:xfrm>
+          <a:prstGeom prst="actionButtonMovie">
+            <a:avLst/>
+          </a:prstGeom>
+        </p:spPr>
+        <p:style>
+          <a:lnRef idx="2">
+            <a:schemeClr val="accent1">
+              <a:shade val="50000"/>
+            </a:schemeClr>
+          </a:lnRef>
+          <a:fillRef idx="1">
+            <a:schemeClr val="accent1"/>
+          </a:fillRef>
+          <a:effectRef idx="0">
+            <a:schemeClr val="accent1"/>
+          </a:effectRef>
+          <a:fontRef idx="minor">
+            <a:schemeClr val="lt1"/>
+          </a:fontRef>
+        </p:style>
+        <p:txBody>
+          <a:bodyPr rtlCol="0" anchor="ctr"/>
+          <a:lstStyle/>
+          <a:p>
+            <a:pPr algn="ctr"/>
+            <a:endParaRPr lang="en-US" sz="4882"/>
+          </a:p>
+        </p:txBody>
+      </p:sp>
+      <p:sp>
+        <p:nvSpPr>
+          <p:cNvPr id="35" name="TextBox 34"/>
+          <p:cNvSpPr txBox="1"/>
+          <p:nvPr/>
+        </p:nvSpPr>
+        <p:spPr>
+          <a:xfrm>
+            <a:off x="32126237" y="25412701"/>
+            <a:ext cx="8040920" cy="571247"/>
+          </a:xfrm>
+          <a:prstGeom prst="rect">
+            <a:avLst/>
+          </a:prstGeom>
+          <a:noFill/>
+        </p:spPr>
+        <p:txBody>
+          <a:bodyPr wrap="square" rtlCol="0">
+            <a:spAutoFit/>
+          </a:bodyPr>
+          <a:lstStyle/>
+          <a:p>
+            <a:r>
+              <a:rPr lang="en-US" sz="3112" dirty="0"/>
+              <a:t>Image of setup w/ </a:t>
+            </a:r>
+            <a:r>
+              <a:rPr lang="en-US" sz="3112" dirty="0" err="1"/>
+              <a:t>cdp</a:t>
+            </a:r>
+            <a:r>
+              <a:rPr lang="en-US" sz="3112" dirty="0"/>
+              <a:t> in place?</a:t>
+            </a:r>
+            <a:endParaRPr lang="en-US" sz="3112" dirty="0"/>
+          </a:p>
+        </p:txBody>
+      </p:sp>
     </p:spTree>
     <p:extLst>
       <p:ext uri="{BB962C8B-B14F-4D97-AF65-F5344CB8AC3E}">
@@ -2997,6 +5042,13 @@
   <p:clrMapOvr>
     <a:masterClrMapping/>
   </p:clrMapOvr>
+  <p:timing>
+    <p:tnLst>
+      <p:par>
+        <p:cTn id="1" dur="indefinite" restart="never" nodeType="tmRoot"/>
+      </p:par>
+    </p:tnLst>
+  </p:timing>
 </p:sld>
 </file>
 
@@ -3259,4 +5311,265 @@
     </a:ext>
   </a:extLst>
 </a:theme>
+</file>
+
+<file path=ppt/theme/theme2.xml><?xml version="1.0" encoding="utf-8"?>
+<a:theme xmlns:a="http://schemas.openxmlformats.org/drawingml/2006/main" name="Office Theme">
+  <a:themeElements>
+    <a:clrScheme name="Office">
+      <a:dk1>
+        <a:sysClr val="windowText" lastClr="000000"/>
+      </a:dk1>
+      <a:lt1>
+        <a:sysClr val="window" lastClr="FFFFFF"/>
+      </a:lt1>
+      <a:dk2>
+        <a:srgbClr val="44546A"/>
+      </a:dk2>
+      <a:lt2>
+        <a:srgbClr val="E7E6E6"/>
+      </a:lt2>
+      <a:accent1>
+        <a:srgbClr val="5B9BD5"/>
+      </a:accent1>
+      <a:accent2>
+        <a:srgbClr val="ED7D31"/>
+      </a:accent2>
+      <a:accent3>
+        <a:srgbClr val="A5A5A5"/>
+      </a:accent3>
+      <a:accent4>
+        <a:srgbClr val="FFC000"/>
+      </a:accent4>
+      <a:accent5>
+        <a:srgbClr val="4472C4"/>
+      </a:accent5>
+      <a:accent6>
+        <a:srgbClr val="70AD47"/>
+      </a:accent6>
+      <a:hlink>
+        <a:srgbClr val="0563C1"/>
+      </a:hlink>
+      <a:folHlink>
+        <a:srgbClr val="954F72"/>
+      </a:folHlink>
+    </a:clrScheme>
+    <a:fontScheme name="Office">
+      <a:majorFont>
+        <a:latin typeface="Calibri Light" panose="020F0302020204030204"/>
+        <a:ea typeface=""/>
+        <a:cs typeface=""/>
+        <a:font script="Jpan" typeface="ＭＳ Ｐゴシック"/>
+        <a:font script="Hang" typeface="맑은 고딕"/>
+        <a:font script="Hans" typeface="宋体"/>
+        <a:font script="Hant" typeface="新細明體"/>
+        <a:font script="Arab" typeface="Times New Roman"/>
+        <a:font script="Hebr" typeface="Times New Roman"/>
+        <a:font script="Thai" typeface="Angsana New"/>
+        <a:font script="Ethi" typeface="Nyala"/>
+        <a:font script="Beng" typeface="Vrinda"/>
+        <a:font script="Gujr" typeface="Shruti"/>
+        <a:font script="Khmr" typeface="MoolBoran"/>
+        <a:font script="Knda" typeface="Tunga"/>
+        <a:font script="Guru" typeface="Raavi"/>
+        <a:font script="Cans" typeface="Euphemia"/>
+        <a:font script="Cher" typeface="Plantagenet Cherokee"/>
+        <a:font script="Yiii" typeface="Microsoft Yi Baiti"/>
+        <a:font script="Tibt" typeface="Microsoft Himalaya"/>
+        <a:font script="Thaa" typeface="MV Boli"/>
+        <a:font script="Deva" typeface="Mangal"/>
+        <a:font script="Telu" typeface="Gautami"/>
+        <a:font script="Taml" typeface="Latha"/>
+        <a:font script="Syrc" typeface="Estrangelo Edessa"/>
+        <a:font script="Orya" typeface="Kalinga"/>
+        <a:font script="Mlym" typeface="Kartika"/>
+        <a:font script="Laoo" typeface="DokChampa"/>
+        <a:font script="Sinh" typeface="Iskoola Pota"/>
+        <a:font script="Mong" typeface="Mongolian Baiti"/>
+        <a:font script="Viet" typeface="Times New Roman"/>
+        <a:font script="Uigh" typeface="Microsoft Uighur"/>
+        <a:font script="Geor" typeface="Sylfaen"/>
+      </a:majorFont>
+      <a:minorFont>
+        <a:latin typeface="Calibri" panose="020F0502020204030204"/>
+        <a:ea typeface=""/>
+        <a:cs typeface=""/>
+        <a:font script="Jpan" typeface="ＭＳ Ｐゴシック"/>
+        <a:font script="Hang" typeface="맑은 고딕"/>
+        <a:font script="Hans" typeface="宋体"/>
+        <a:font script="Hant" typeface="新細明體"/>
+        <a:font script="Arab" typeface="Arial"/>
+        <a:font script="Hebr" typeface="Arial"/>
+        <a:font script="Thai" typeface="Cordia New"/>
+        <a:font script="Ethi" typeface="Nyala"/>
+        <a:font script="Beng" typeface="Vrinda"/>
+        <a:font script="Gujr" typeface="Shruti"/>
+        <a:font script="Khmr" typeface="DaunPenh"/>
+        <a:font script="Knda" typeface="Tunga"/>
+        <a:font script="Guru" typeface="Raavi"/>
+        <a:font script="Cans" typeface="Euphemia"/>
+        <a:font script="Cher" typeface="Plantagenet Cherokee"/>
+        <a:font script="Yiii" typeface="Microsoft Yi Baiti"/>
+        <a:font script="Tibt" typeface="Microsoft Himalaya"/>
+        <a:font script="Thaa" typeface="MV Boli"/>
+        <a:font script="Deva" typeface="Mangal"/>
+        <a:font script="Telu" typeface="Gautami"/>
+        <a:font script="Taml" typeface="Latha"/>
+        <a:font script="Syrc" typeface="Estrangelo Edessa"/>
+        <a:font script="Orya" typeface="Kalinga"/>
+        <a:font script="Mlym" typeface="Kartika"/>
+        <a:font script="Laoo" typeface="DokChampa"/>
+        <a:font script="Sinh" typeface="Iskoola Pota"/>
+        <a:font script="Mong" typeface="Mongolian Baiti"/>
+        <a:font script="Viet" typeface="Arial"/>
+        <a:font script="Uigh" typeface="Microsoft Uighur"/>
+        <a:font script="Geor" typeface="Sylfaen"/>
+      </a:minorFont>
+    </a:fontScheme>
+    <a:fmtScheme name="Office">
+      <a:fillStyleLst>
+        <a:solidFill>
+          <a:schemeClr val="phClr"/>
+        </a:solidFill>
+        <a:gradFill rotWithShape="1">
+          <a:gsLst>
+            <a:gs pos="0">
+              <a:schemeClr val="phClr">
+                <a:lumMod val="110000"/>
+                <a:satMod val="105000"/>
+                <a:tint val="67000"/>
+              </a:schemeClr>
+            </a:gs>
+            <a:gs pos="50000">
+              <a:schemeClr val="phClr">
+                <a:lumMod val="105000"/>
+                <a:satMod val="103000"/>
+                <a:tint val="73000"/>
+              </a:schemeClr>
+            </a:gs>
+            <a:gs pos="100000">
+              <a:schemeClr val="phClr">
+                <a:lumMod val="105000"/>
+                <a:satMod val="109000"/>
+                <a:tint val="81000"/>
+              </a:schemeClr>
+            </a:gs>
+          </a:gsLst>
+          <a:lin ang="5400000" scaled="0"/>
+        </a:gradFill>
+        <a:gradFill rotWithShape="1">
+          <a:gsLst>
+            <a:gs pos="0">
+              <a:schemeClr val="phClr">
+                <a:satMod val="103000"/>
+                <a:lumMod val="102000"/>
+                <a:tint val="94000"/>
+              </a:schemeClr>
+            </a:gs>
+            <a:gs pos="50000">
+              <a:schemeClr val="phClr">
+                <a:satMod val="110000"/>
+                <a:lumMod val="100000"/>
+                <a:shade val="100000"/>
+              </a:schemeClr>
+            </a:gs>
+            <a:gs pos="100000">
+              <a:schemeClr val="phClr">
+                <a:lumMod val="99000"/>
+                <a:satMod val="120000"/>
+                <a:shade val="78000"/>
+              </a:schemeClr>
+            </a:gs>
+          </a:gsLst>
+          <a:lin ang="5400000" scaled="0"/>
+        </a:gradFill>
+      </a:fillStyleLst>
+      <a:lnStyleLst>
+        <a:ln w="6350" cap="flat" cmpd="sng" algn="ctr">
+          <a:solidFill>
+            <a:schemeClr val="phClr"/>
+          </a:solidFill>
+          <a:prstDash val="solid"/>
+          <a:miter lim="800000"/>
+        </a:ln>
+        <a:ln w="12700" cap="flat" cmpd="sng" algn="ctr">
+          <a:solidFill>
+            <a:schemeClr val="phClr"/>
+          </a:solidFill>
+          <a:prstDash val="solid"/>
+          <a:miter lim="800000"/>
+        </a:ln>
+        <a:ln w="19050" cap="flat" cmpd="sng" algn="ctr">
+          <a:solidFill>
+            <a:schemeClr val="phClr"/>
+          </a:solidFill>
+          <a:prstDash val="solid"/>
+          <a:miter lim="800000"/>
+        </a:ln>
+      </a:lnStyleLst>
+      <a:effectStyleLst>
+        <a:effectStyle>
+          <a:effectLst/>
+        </a:effectStyle>
+        <a:effectStyle>
+          <a:effectLst/>
+        </a:effectStyle>
+        <a:effectStyle>
+          <a:effectLst>
+            <a:outerShdw blurRad="57150" dist="19050" dir="5400000" algn="ctr" rotWithShape="0">
+              <a:srgbClr val="000000">
+                <a:alpha val="63000"/>
+              </a:srgbClr>
+            </a:outerShdw>
+          </a:effectLst>
+        </a:effectStyle>
+      </a:effectStyleLst>
+      <a:bgFillStyleLst>
+        <a:solidFill>
+          <a:schemeClr val="phClr"/>
+        </a:solidFill>
+        <a:solidFill>
+          <a:schemeClr val="phClr">
+            <a:tint val="95000"/>
+            <a:satMod val="170000"/>
+          </a:schemeClr>
+        </a:solidFill>
+        <a:gradFill rotWithShape="1">
+          <a:gsLst>
+            <a:gs pos="0">
+              <a:schemeClr val="phClr">
+                <a:tint val="93000"/>
+                <a:satMod val="150000"/>
+                <a:shade val="98000"/>
+                <a:lumMod val="102000"/>
+              </a:schemeClr>
+            </a:gs>
+            <a:gs pos="50000">
+              <a:schemeClr val="phClr">
+                <a:tint val="98000"/>
+                <a:satMod val="130000"/>
+                <a:shade val="90000"/>
+                <a:lumMod val="103000"/>
+              </a:schemeClr>
+            </a:gs>
+            <a:gs pos="100000">
+              <a:schemeClr val="phClr">
+                <a:shade val="63000"/>
+                <a:satMod val="120000"/>
+              </a:schemeClr>
+            </a:gs>
+          </a:gsLst>
+          <a:lin ang="5400000" scaled="0"/>
+        </a:gradFill>
+      </a:bgFillStyleLst>
+    </a:fmtScheme>
+  </a:themeElements>
+  <a:objectDefaults/>
+  <a:extraClrSchemeLst/>
+  <a:extLst>
+    <a:ext uri="{05A4C25C-085E-4340-85A3-A5531E510DB2}">
+      <thm15:themeFamily xmlns:thm15="http://schemas.microsoft.com/office/thememl/2012/main" name="Office Theme" id="{62F939B6-93AF-4DB8-9C6B-D6C7DFDC589F}" vid="{4A3C46E8-61CC-4603-A589-7422A47A8E4A}"/>
+    </a:ext>
+  </a:extLst>
+</a:theme>
 </file>
</xml_diff>